<commit_message>
minor changes carried out
</commit_message>
<xml_diff>
--- a/project3.pptx
+++ b/project3.pptx
@@ -6,11 +6,13 @@
   </p:sldMasterIdLst>
   <p:sldIdLst>
     <p:sldId id="256" r:id="rId2"/>
-    <p:sldId id="257" r:id="rId3"/>
-    <p:sldId id="258" r:id="rId4"/>
-    <p:sldId id="259" r:id="rId5"/>
-    <p:sldId id="260" r:id="rId6"/>
-    <p:sldId id="261" r:id="rId7"/>
+    <p:sldId id="262" r:id="rId3"/>
+    <p:sldId id="263" r:id="rId4"/>
+    <p:sldId id="257" r:id="rId5"/>
+    <p:sldId id="258" r:id="rId6"/>
+    <p:sldId id="259" r:id="rId7"/>
+    <p:sldId id="260" r:id="rId8"/>
+    <p:sldId id="261" r:id="rId9"/>
   </p:sldIdLst>
   <p:sldSz cx="12192000" cy="6858000"/>
   <p:notesSz cx="6858000" cy="9144000"/>
@@ -126,6 +128,3969 @@
 </p1510:revInfo>
 </file>
 
+<file path=ppt/charts/chart1.xml><?xml version="1.0" encoding="utf-8"?>
+<c:chartSpace xmlns:c="http://schemas.openxmlformats.org/drawingml/2006/chart" xmlns:a="http://schemas.openxmlformats.org/drawingml/2006/main" xmlns:r="http://schemas.openxmlformats.org/officeDocument/2006/relationships" xmlns:c16r2="http://schemas.microsoft.com/office/drawing/2015/06/chart">
+  <c:date1904 val="0"/>
+  <c:lang val="en-GB"/>
+  <c:roundedCorners val="0"/>
+  <mc:AlternateContent xmlns:mc="http://schemas.openxmlformats.org/markup-compatibility/2006">
+    <mc:Choice xmlns:c14="http://schemas.microsoft.com/office/drawing/2007/8/2/chart" Requires="c14">
+      <c14:style val="102"/>
+    </mc:Choice>
+    <mc:Fallback>
+      <c:style val="2"/>
+    </mc:Fallback>
+  </mc:AlternateContent>
+  <c:chart>
+    <c:title>
+      <c:tx>
+        <c:rich>
+          <a:bodyPr rot="0" spcFirstLastPara="1" vertOverflow="ellipsis" vert="horz" wrap="square" anchor="ctr" anchorCtr="1"/>
+          <a:lstStyle/>
+          <a:p>
+            <a:pPr>
+              <a:defRPr sz="1600" b="1" i="0" u="none" strike="noStrike" kern="1200" baseline="0">
+                <a:solidFill>
+                  <a:schemeClr val="tx2"/>
+                </a:solidFill>
+                <a:latin typeface="+mn-lt"/>
+                <a:ea typeface="+mn-ea"/>
+                <a:cs typeface="+mn-cs"/>
+              </a:defRPr>
+            </a:pPr>
+            <a:r>
+              <a:rPr lang="en-GB" sz="1600" b="1" i="0" u="none" strike="noStrike" baseline="0" dirty="0">
+                <a:latin typeface="Century Gothic" panose="020B0502020202020204" pitchFamily="34" charset="0"/>
+              </a:rPr>
+              <a:t>Monthly Average Orders from 2013 to 2017</a:t>
+            </a:r>
+            <a:endParaRPr lang="en-US" dirty="0">
+              <a:latin typeface="Century Gothic" panose="020B0502020202020204" pitchFamily="34" charset="0"/>
+            </a:endParaRPr>
+          </a:p>
+        </c:rich>
+      </c:tx>
+      <c:layout>
+        <c:manualLayout>
+          <c:xMode val="edge"/>
+          <c:yMode val="edge"/>
+          <c:x val="2.2417331070795743E-2"/>
+          <c:y val="1.9605557789697203E-2"/>
+        </c:manualLayout>
+      </c:layout>
+      <c:overlay val="0"/>
+      <c:spPr>
+        <a:noFill/>
+        <a:ln>
+          <a:noFill/>
+        </a:ln>
+        <a:effectLst/>
+      </c:spPr>
+      <c:txPr>
+        <a:bodyPr rot="0" spcFirstLastPara="1" vertOverflow="ellipsis" vert="horz" wrap="square" anchor="ctr" anchorCtr="1"/>
+        <a:lstStyle/>
+        <a:p>
+          <a:pPr>
+            <a:defRPr sz="1600" b="1" i="0" u="none" strike="noStrike" kern="1200" baseline="0">
+              <a:solidFill>
+                <a:schemeClr val="tx2"/>
+              </a:solidFill>
+              <a:latin typeface="+mn-lt"/>
+              <a:ea typeface="+mn-ea"/>
+              <a:cs typeface="+mn-cs"/>
+            </a:defRPr>
+          </a:pPr>
+          <a:endParaRPr lang="en-NG"/>
+        </a:p>
+      </c:txPr>
+    </c:title>
+    <c:autoTitleDeleted val="0"/>
+    <c:plotArea>
+      <c:layout/>
+      <c:barChart>
+        <c:barDir val="col"/>
+        <c:grouping val="clustered"/>
+        <c:varyColors val="0"/>
+        <c:ser>
+          <c:idx val="0"/>
+          <c:order val="0"/>
+          <c:tx>
+            <c:strRef>
+              <c:f>Sheet1!$B$1</c:f>
+              <c:strCache>
+                <c:ptCount val="1"/>
+                <c:pt idx="0">
+                  <c:v>avg_orders_per_month</c:v>
+                </c:pt>
+              </c:strCache>
+            </c:strRef>
+          </c:tx>
+          <c:spPr>
+            <a:gradFill rotWithShape="1">
+              <a:gsLst>
+                <a:gs pos="0">
+                  <a:schemeClr val="accent1">
+                    <a:satMod val="103000"/>
+                    <a:lumMod val="102000"/>
+                    <a:tint val="94000"/>
+                  </a:schemeClr>
+                </a:gs>
+                <a:gs pos="50000">
+                  <a:schemeClr val="accent1">
+                    <a:satMod val="110000"/>
+                    <a:lumMod val="100000"/>
+                    <a:shade val="100000"/>
+                  </a:schemeClr>
+                </a:gs>
+                <a:gs pos="100000">
+                  <a:schemeClr val="accent1">
+                    <a:lumMod val="99000"/>
+                    <a:satMod val="120000"/>
+                    <a:shade val="78000"/>
+                  </a:schemeClr>
+                </a:gs>
+              </a:gsLst>
+              <a:lin ang="5400000" scaled="0"/>
+            </a:gradFill>
+            <a:ln>
+              <a:noFill/>
+            </a:ln>
+            <a:effectLst/>
+          </c:spPr>
+          <c:invertIfNegative val="0"/>
+          <c:dLbls>
+            <c:spPr>
+              <a:noFill/>
+              <a:ln>
+                <a:noFill/>
+              </a:ln>
+              <a:effectLst/>
+            </c:spPr>
+            <c:txPr>
+              <a:bodyPr rot="0" spcFirstLastPara="1" vertOverflow="ellipsis" vert="horz" wrap="square" lIns="38100" tIns="19050" rIns="38100" bIns="19050" anchor="ctr" anchorCtr="1">
+                <a:spAutoFit/>
+              </a:bodyPr>
+              <a:lstStyle/>
+              <a:p>
+                <a:pPr>
+                  <a:defRPr sz="900" b="1" i="0" u="none" strike="noStrike" kern="1200" baseline="0">
+                    <a:solidFill>
+                      <a:schemeClr val="tx2"/>
+                    </a:solidFill>
+                    <a:latin typeface="+mn-lt"/>
+                    <a:ea typeface="+mn-ea"/>
+                    <a:cs typeface="+mn-cs"/>
+                  </a:defRPr>
+                </a:pPr>
+                <a:endParaRPr lang="en-NG"/>
+              </a:p>
+            </c:txPr>
+            <c:dLblPos val="outEnd"/>
+            <c:showLegendKey val="0"/>
+            <c:showVal val="1"/>
+            <c:showCatName val="0"/>
+            <c:showSerName val="0"/>
+            <c:showPercent val="0"/>
+            <c:showBubbleSize val="0"/>
+            <c:showLeaderLines val="0"/>
+            <c:extLst>
+              <c:ext xmlns:c15="http://schemas.microsoft.com/office/drawing/2012/chart" uri="{CE6537A1-D6FC-4f65-9D91-7224C49458BB}">
+                <c15:showLeaderLines val="1"/>
+                <c15:leaderLines>
+                  <c:spPr>
+                    <a:ln w="9525">
+                      <a:solidFill>
+                        <a:schemeClr val="tx2">
+                          <a:lumMod val="35000"/>
+                          <a:lumOff val="65000"/>
+                        </a:schemeClr>
+                      </a:solidFill>
+                    </a:ln>
+                    <a:effectLst/>
+                  </c:spPr>
+                </c15:leaderLines>
+              </c:ext>
+            </c:extLst>
+          </c:dLbls>
+          <c:cat>
+            <c:numRef>
+              <c:f>Sheet1!$A$2:$A$6</c:f>
+              <c:numCache>
+                <c:formatCode>@</c:formatCode>
+                <c:ptCount val="5"/>
+                <c:pt idx="0">
+                  <c:v>2013</c:v>
+                </c:pt>
+                <c:pt idx="1">
+                  <c:v>2014</c:v>
+                </c:pt>
+                <c:pt idx="2">
+                  <c:v>2015</c:v>
+                </c:pt>
+                <c:pt idx="3">
+                  <c:v>2016</c:v>
+                </c:pt>
+                <c:pt idx="4">
+                  <c:v>2017</c:v>
+                </c:pt>
+              </c:numCache>
+            </c:numRef>
+          </c:cat>
+          <c:val>
+            <c:numRef>
+              <c:f>Sheet1!$B$2:$B$6</c:f>
+              <c:numCache>
+                <c:formatCode>General</c:formatCode>
+                <c:ptCount val="5"/>
+                <c:pt idx="0">
+                  <c:v>90</c:v>
+                </c:pt>
+                <c:pt idx="1">
+                  <c:v>90</c:v>
+                </c:pt>
+                <c:pt idx="2">
+                  <c:v>150</c:v>
+                </c:pt>
+                <c:pt idx="3">
+                  <c:v>300</c:v>
+                </c:pt>
+                <c:pt idx="4">
+                  <c:v>360</c:v>
+                </c:pt>
+              </c:numCache>
+            </c:numRef>
+          </c:val>
+          <c:extLst>
+            <c:ext xmlns:c16="http://schemas.microsoft.com/office/drawing/2014/chart" uri="{C3380CC4-5D6E-409C-BE32-E72D297353CC}">
+              <c16:uniqueId val="{00000000-8D75-FC43-8F61-A46CF347D216}"/>
+            </c:ext>
+          </c:extLst>
+        </c:ser>
+        <c:dLbls>
+          <c:dLblPos val="outEnd"/>
+          <c:showLegendKey val="0"/>
+          <c:showVal val="1"/>
+          <c:showCatName val="0"/>
+          <c:showSerName val="0"/>
+          <c:showPercent val="0"/>
+          <c:showBubbleSize val="0"/>
+        </c:dLbls>
+        <c:gapWidth val="100"/>
+        <c:overlap val="-24"/>
+        <c:axId val="1033047615"/>
+        <c:axId val="1032888767"/>
+      </c:barChart>
+      <c:catAx>
+        <c:axId val="1033047615"/>
+        <c:scaling>
+          <c:orientation val="minMax"/>
+        </c:scaling>
+        <c:delete val="0"/>
+        <c:axPos val="b"/>
+        <c:numFmt formatCode="@" sourceLinked="1"/>
+        <c:majorTickMark val="none"/>
+        <c:minorTickMark val="none"/>
+        <c:tickLblPos val="nextTo"/>
+        <c:spPr>
+          <a:noFill/>
+          <a:ln w="9525" cap="flat" cmpd="sng" algn="ctr">
+            <a:solidFill>
+              <a:schemeClr val="tx2">
+                <a:lumMod val="15000"/>
+                <a:lumOff val="85000"/>
+              </a:schemeClr>
+            </a:solidFill>
+            <a:round/>
+          </a:ln>
+          <a:effectLst/>
+        </c:spPr>
+        <c:txPr>
+          <a:bodyPr rot="-60000000" spcFirstLastPara="1" vertOverflow="ellipsis" vert="horz" wrap="square" anchor="ctr" anchorCtr="1"/>
+          <a:lstStyle/>
+          <a:p>
+            <a:pPr>
+              <a:defRPr sz="900" b="0" i="0" u="none" strike="noStrike" kern="1200" baseline="0">
+                <a:solidFill>
+                  <a:schemeClr val="tx2"/>
+                </a:solidFill>
+                <a:latin typeface="+mn-lt"/>
+                <a:ea typeface="+mn-ea"/>
+                <a:cs typeface="+mn-cs"/>
+              </a:defRPr>
+            </a:pPr>
+            <a:endParaRPr lang="en-NG"/>
+          </a:p>
+        </c:txPr>
+        <c:crossAx val="1032888767"/>
+        <c:crosses val="autoZero"/>
+        <c:auto val="1"/>
+        <c:lblAlgn val="ctr"/>
+        <c:lblOffset val="100"/>
+        <c:noMultiLvlLbl val="0"/>
+      </c:catAx>
+      <c:valAx>
+        <c:axId val="1032888767"/>
+        <c:scaling>
+          <c:orientation val="minMax"/>
+        </c:scaling>
+        <c:delete val="1"/>
+        <c:axPos val="l"/>
+        <c:numFmt formatCode="General" sourceLinked="1"/>
+        <c:majorTickMark val="none"/>
+        <c:minorTickMark val="none"/>
+        <c:tickLblPos val="nextTo"/>
+        <c:crossAx val="1033047615"/>
+        <c:crosses val="autoZero"/>
+        <c:crossBetween val="between"/>
+      </c:valAx>
+      <c:spPr>
+        <a:noFill/>
+        <a:ln>
+          <a:noFill/>
+        </a:ln>
+        <a:effectLst/>
+      </c:spPr>
+    </c:plotArea>
+    <c:plotVisOnly val="1"/>
+    <c:dispBlanksAs val="gap"/>
+    <c:showDLblsOverMax val="0"/>
+  </c:chart>
+  <c:spPr>
+    <a:noFill/>
+    <a:ln>
+      <a:solidFill>
+        <a:schemeClr val="tx1">
+          <a:lumMod val="50000"/>
+          <a:lumOff val="50000"/>
+        </a:schemeClr>
+      </a:solidFill>
+    </a:ln>
+    <a:effectLst/>
+  </c:spPr>
+  <c:txPr>
+    <a:bodyPr/>
+    <a:lstStyle/>
+    <a:p>
+      <a:pPr>
+        <a:defRPr/>
+      </a:pPr>
+      <a:endParaRPr lang="en-NG"/>
+    </a:p>
+  </c:txPr>
+  <c:externalData r:id="rId3">
+    <c:autoUpdate val="0"/>
+  </c:externalData>
+</c:chartSpace>
+</file>
+
+<file path=ppt/charts/chart2.xml><?xml version="1.0" encoding="utf-8"?>
+<c:chartSpace xmlns:c="http://schemas.openxmlformats.org/drawingml/2006/chart" xmlns:a="http://schemas.openxmlformats.org/drawingml/2006/main" xmlns:r="http://schemas.openxmlformats.org/officeDocument/2006/relationships" xmlns:c16r2="http://schemas.microsoft.com/office/drawing/2015/06/chart">
+  <c:date1904 val="0"/>
+  <c:lang val="en-GB"/>
+  <c:roundedCorners val="0"/>
+  <mc:AlternateContent xmlns:mc="http://schemas.openxmlformats.org/markup-compatibility/2006">
+    <mc:Choice xmlns:c14="http://schemas.microsoft.com/office/drawing/2007/8/2/chart" Requires="c14">
+      <c14:style val="102"/>
+    </mc:Choice>
+    <mc:Fallback>
+      <c:style val="2"/>
+    </mc:Fallback>
+  </mc:AlternateContent>
+  <c:chart>
+    <c:title>
+      <c:tx>
+        <c:rich>
+          <a:bodyPr rot="0" spcFirstLastPara="1" vertOverflow="ellipsis" vert="horz" wrap="square" anchor="ctr" anchorCtr="1"/>
+          <a:lstStyle/>
+          <a:p>
+            <a:pPr>
+              <a:defRPr sz="1400" b="1" i="0" u="none" strike="noStrike" kern="1200" spc="0" baseline="0">
+                <a:solidFill>
+                  <a:schemeClr val="tx1">
+                    <a:lumMod val="65000"/>
+                    <a:lumOff val="35000"/>
+                  </a:schemeClr>
+                </a:solidFill>
+                <a:latin typeface="Century Gothic" panose="020B0502020202020204" pitchFamily="34" charset="0"/>
+                <a:ea typeface="+mn-ea"/>
+                <a:cs typeface="+mn-cs"/>
+              </a:defRPr>
+            </a:pPr>
+            <a:r>
+              <a:rPr lang="en-US" sz="1400" b="1" dirty="0">
+                <a:latin typeface="Century Gothic" panose="020B0502020202020204" pitchFamily="34" charset="0"/>
+              </a:rPr>
+              <a:t>Orders completed and web events per customer</a:t>
+            </a:r>
+          </a:p>
+        </c:rich>
+      </c:tx>
+      <c:layout>
+        <c:manualLayout>
+          <c:xMode val="edge"/>
+          <c:yMode val="edge"/>
+          <c:x val="3.4683551394616603E-2"/>
+          <c:y val="2.5909971576103797E-2"/>
+        </c:manualLayout>
+      </c:layout>
+      <c:overlay val="0"/>
+      <c:spPr>
+        <a:noFill/>
+        <a:ln>
+          <a:noFill/>
+        </a:ln>
+        <a:effectLst/>
+      </c:spPr>
+      <c:txPr>
+        <a:bodyPr rot="0" spcFirstLastPara="1" vertOverflow="ellipsis" vert="horz" wrap="square" anchor="ctr" anchorCtr="1"/>
+        <a:lstStyle/>
+        <a:p>
+          <a:pPr>
+            <a:defRPr sz="1400" b="1" i="0" u="none" strike="noStrike" kern="1200" spc="0" baseline="0">
+              <a:solidFill>
+                <a:schemeClr val="tx1">
+                  <a:lumMod val="65000"/>
+                  <a:lumOff val="35000"/>
+                </a:schemeClr>
+              </a:solidFill>
+              <a:latin typeface="Century Gothic" panose="020B0502020202020204" pitchFamily="34" charset="0"/>
+              <a:ea typeface="+mn-ea"/>
+              <a:cs typeface="+mn-cs"/>
+            </a:defRPr>
+          </a:pPr>
+          <a:endParaRPr lang="en-NG"/>
+        </a:p>
+      </c:txPr>
+    </c:title>
+    <c:autoTitleDeleted val="0"/>
+    <c:plotArea>
+      <c:layout/>
+      <c:scatterChart>
+        <c:scatterStyle val="lineMarker"/>
+        <c:varyColors val="0"/>
+        <c:ser>
+          <c:idx val="0"/>
+          <c:order val="0"/>
+          <c:tx>
+            <c:strRef>
+              <c:f>'data-export1'!$C$1</c:f>
+              <c:strCache>
+                <c:ptCount val="1"/>
+                <c:pt idx="0">
+                  <c:v>total_orders</c:v>
+                </c:pt>
+              </c:strCache>
+            </c:strRef>
+          </c:tx>
+          <c:spPr>
+            <a:ln w="25400" cap="rnd">
+              <a:noFill/>
+              <a:round/>
+            </a:ln>
+            <a:effectLst/>
+          </c:spPr>
+          <c:marker>
+            <c:symbol val="circle"/>
+            <c:size val="5"/>
+            <c:spPr>
+              <a:solidFill>
+                <a:schemeClr val="accent1"/>
+              </a:solidFill>
+              <a:ln w="9525">
+                <a:solidFill>
+                  <a:schemeClr val="accent1"/>
+                </a:solidFill>
+              </a:ln>
+              <a:effectLst/>
+            </c:spPr>
+          </c:marker>
+          <c:xVal>
+            <c:numRef>
+              <c:f>'data-export1'!$B$2:$B$352</c:f>
+              <c:numCache>
+                <c:formatCode>General</c:formatCode>
+                <c:ptCount val="351"/>
+                <c:pt idx="0">
+                  <c:v>13</c:v>
+                </c:pt>
+                <c:pt idx="1">
+                  <c:v>76</c:v>
+                </c:pt>
+                <c:pt idx="2">
+                  <c:v>59</c:v>
+                </c:pt>
+                <c:pt idx="3">
+                  <c:v>57</c:v>
+                </c:pt>
+                <c:pt idx="4">
+                  <c:v>77</c:v>
+                </c:pt>
+                <c:pt idx="5">
+                  <c:v>83</c:v>
+                </c:pt>
+                <c:pt idx="6">
+                  <c:v>77</c:v>
+                </c:pt>
+                <c:pt idx="7">
+                  <c:v>55</c:v>
+                </c:pt>
+                <c:pt idx="8">
+                  <c:v>86</c:v>
+                </c:pt>
+                <c:pt idx="9">
+                  <c:v>69</c:v>
+                </c:pt>
+                <c:pt idx="10">
+                  <c:v>65</c:v>
+                </c:pt>
+                <c:pt idx="11">
+                  <c:v>45</c:v>
+                </c:pt>
+                <c:pt idx="12">
+                  <c:v>78</c:v>
+                </c:pt>
+                <c:pt idx="13">
+                  <c:v>90</c:v>
+                </c:pt>
+                <c:pt idx="14">
+                  <c:v>89</c:v>
+                </c:pt>
+                <c:pt idx="15">
+                  <c:v>44</c:v>
+                </c:pt>
+                <c:pt idx="16">
+                  <c:v>91</c:v>
+                </c:pt>
+                <c:pt idx="17">
+                  <c:v>83</c:v>
+                </c:pt>
+                <c:pt idx="18">
+                  <c:v>75</c:v>
+                </c:pt>
+                <c:pt idx="19">
+                  <c:v>50</c:v>
+                </c:pt>
+                <c:pt idx="20">
+                  <c:v>93</c:v>
+                </c:pt>
+                <c:pt idx="21">
+                  <c:v>82</c:v>
+                </c:pt>
+                <c:pt idx="22">
+                  <c:v>64</c:v>
+                </c:pt>
+                <c:pt idx="23">
+                  <c:v>56</c:v>
+                </c:pt>
+                <c:pt idx="24">
+                  <c:v>53</c:v>
+                </c:pt>
+                <c:pt idx="25">
+                  <c:v>96</c:v>
+                </c:pt>
+                <c:pt idx="26">
+                  <c:v>76</c:v>
+                </c:pt>
+                <c:pt idx="27">
+                  <c:v>70</c:v>
+                </c:pt>
+                <c:pt idx="28">
+                  <c:v>64</c:v>
+                </c:pt>
+                <c:pt idx="29">
+                  <c:v>52</c:v>
+                </c:pt>
+                <c:pt idx="30">
+                  <c:v>40</c:v>
+                </c:pt>
+                <c:pt idx="31">
+                  <c:v>85</c:v>
+                </c:pt>
+                <c:pt idx="32">
+                  <c:v>79</c:v>
+                </c:pt>
+                <c:pt idx="33">
+                  <c:v>77</c:v>
+                </c:pt>
+                <c:pt idx="34">
+                  <c:v>73</c:v>
+                </c:pt>
+                <c:pt idx="35">
+                  <c:v>47</c:v>
+                </c:pt>
+                <c:pt idx="36">
+                  <c:v>94</c:v>
+                </c:pt>
+                <c:pt idx="37">
+                  <c:v>89</c:v>
+                </c:pt>
+                <c:pt idx="38">
+                  <c:v>83</c:v>
+                </c:pt>
+                <c:pt idx="39">
+                  <c:v>82</c:v>
+                </c:pt>
+                <c:pt idx="40">
+                  <c:v>46</c:v>
+                </c:pt>
+                <c:pt idx="41">
+                  <c:v>101</c:v>
+                </c:pt>
+                <c:pt idx="42">
+                  <c:v>80</c:v>
+                </c:pt>
+                <c:pt idx="43">
+                  <c:v>67</c:v>
+                </c:pt>
+                <c:pt idx="44">
+                  <c:v>54</c:v>
+                </c:pt>
+                <c:pt idx="45">
+                  <c:v>89</c:v>
+                </c:pt>
+                <c:pt idx="46">
+                  <c:v>62</c:v>
+                </c:pt>
+                <c:pt idx="47">
+                  <c:v>74</c:v>
+                </c:pt>
+                <c:pt idx="48">
+                  <c:v>45</c:v>
+                </c:pt>
+                <c:pt idx="49">
+                  <c:v>64</c:v>
+                </c:pt>
+                <c:pt idx="50">
+                  <c:v>55</c:v>
+                </c:pt>
+                <c:pt idx="51">
+                  <c:v>59</c:v>
+                </c:pt>
+                <c:pt idx="52">
+                  <c:v>48</c:v>
+                </c:pt>
+                <c:pt idx="53">
+                  <c:v>40</c:v>
+                </c:pt>
+                <c:pt idx="54">
+                  <c:v>29</c:v>
+                </c:pt>
+                <c:pt idx="55">
+                  <c:v>48</c:v>
+                </c:pt>
+                <c:pt idx="56">
+                  <c:v>39</c:v>
+                </c:pt>
+                <c:pt idx="57">
+                  <c:v>43</c:v>
+                </c:pt>
+                <c:pt idx="58">
+                  <c:v>79</c:v>
+                </c:pt>
+                <c:pt idx="59">
+                  <c:v>52</c:v>
+                </c:pt>
+                <c:pt idx="60">
+                  <c:v>44</c:v>
+                </c:pt>
+                <c:pt idx="61">
+                  <c:v>27</c:v>
+                </c:pt>
+                <c:pt idx="62">
+                  <c:v>46</c:v>
+                </c:pt>
+                <c:pt idx="63">
+                  <c:v>39</c:v>
+                </c:pt>
+                <c:pt idx="64">
+                  <c:v>56</c:v>
+                </c:pt>
+                <c:pt idx="65">
+                  <c:v>45</c:v>
+                </c:pt>
+                <c:pt idx="66">
+                  <c:v>31</c:v>
+                </c:pt>
+                <c:pt idx="67">
+                  <c:v>70</c:v>
+                </c:pt>
+                <c:pt idx="68">
+                  <c:v>63</c:v>
+                </c:pt>
+                <c:pt idx="69">
+                  <c:v>57</c:v>
+                </c:pt>
+                <c:pt idx="70">
+                  <c:v>44</c:v>
+                </c:pt>
+                <c:pt idx="71">
+                  <c:v>29</c:v>
+                </c:pt>
+                <c:pt idx="72">
+                  <c:v>41</c:v>
+                </c:pt>
+                <c:pt idx="73">
+                  <c:v>42</c:v>
+                </c:pt>
+                <c:pt idx="74">
+                  <c:v>35</c:v>
+                </c:pt>
+                <c:pt idx="75">
+                  <c:v>21</c:v>
+                </c:pt>
+                <c:pt idx="76">
+                  <c:v>36</c:v>
+                </c:pt>
+                <c:pt idx="77">
+                  <c:v>34</c:v>
+                </c:pt>
+                <c:pt idx="78">
+                  <c:v>22</c:v>
+                </c:pt>
+                <c:pt idx="79">
+                  <c:v>21</c:v>
+                </c:pt>
+                <c:pt idx="80">
+                  <c:v>57</c:v>
+                </c:pt>
+                <c:pt idx="81">
+                  <c:v>41</c:v>
+                </c:pt>
+                <c:pt idx="82">
+                  <c:v>36</c:v>
+                </c:pt>
+                <c:pt idx="83">
+                  <c:v>33</c:v>
+                </c:pt>
+                <c:pt idx="84">
+                  <c:v>26</c:v>
+                </c:pt>
+                <c:pt idx="85">
+                  <c:v>55</c:v>
+                </c:pt>
+                <c:pt idx="86">
+                  <c:v>39</c:v>
+                </c:pt>
+                <c:pt idx="87">
+                  <c:v>23</c:v>
+                </c:pt>
+                <c:pt idx="88">
+                  <c:v>68</c:v>
+                </c:pt>
+                <c:pt idx="89">
+                  <c:v>50</c:v>
+                </c:pt>
+                <c:pt idx="90">
+                  <c:v>46</c:v>
+                </c:pt>
+                <c:pt idx="91">
+                  <c:v>31</c:v>
+                </c:pt>
+                <c:pt idx="92">
+                  <c:v>29</c:v>
+                </c:pt>
+                <c:pt idx="93">
+                  <c:v>25</c:v>
+                </c:pt>
+                <c:pt idx="94">
+                  <c:v>21</c:v>
+                </c:pt>
+                <c:pt idx="95">
+                  <c:v>40</c:v>
+                </c:pt>
+                <c:pt idx="96">
+                  <c:v>34</c:v>
+                </c:pt>
+                <c:pt idx="97">
+                  <c:v>33</c:v>
+                </c:pt>
+                <c:pt idx="98">
+                  <c:v>32</c:v>
+                </c:pt>
+                <c:pt idx="99">
+                  <c:v>29</c:v>
+                </c:pt>
+                <c:pt idx="100">
+                  <c:v>28</c:v>
+                </c:pt>
+                <c:pt idx="101">
+                  <c:v>27</c:v>
+                </c:pt>
+                <c:pt idx="102">
+                  <c:v>65</c:v>
+                </c:pt>
+                <c:pt idx="103">
+                  <c:v>40</c:v>
+                </c:pt>
+                <c:pt idx="104">
+                  <c:v>39</c:v>
+                </c:pt>
+                <c:pt idx="105">
+                  <c:v>33</c:v>
+                </c:pt>
+                <c:pt idx="106">
+                  <c:v>27</c:v>
+                </c:pt>
+                <c:pt idx="107">
+                  <c:v>17</c:v>
+                </c:pt>
+                <c:pt idx="108">
+                  <c:v>16</c:v>
+                </c:pt>
+                <c:pt idx="109">
+                  <c:v>37</c:v>
+                </c:pt>
+                <c:pt idx="110">
+                  <c:v>36</c:v>
+                </c:pt>
+                <c:pt idx="111">
+                  <c:v>35</c:v>
+                </c:pt>
+                <c:pt idx="112">
+                  <c:v>30</c:v>
+                </c:pt>
+                <c:pt idx="113">
+                  <c:v>25</c:v>
+                </c:pt>
+                <c:pt idx="114">
+                  <c:v>22</c:v>
+                </c:pt>
+                <c:pt idx="115">
+                  <c:v>16</c:v>
+                </c:pt>
+                <c:pt idx="116">
+                  <c:v>31</c:v>
+                </c:pt>
+                <c:pt idx="117">
+                  <c:v>29</c:v>
+                </c:pt>
+                <c:pt idx="118">
+                  <c:v>38</c:v>
+                </c:pt>
+                <c:pt idx="119">
+                  <c:v>34</c:v>
+                </c:pt>
+                <c:pt idx="120">
+                  <c:v>26</c:v>
+                </c:pt>
+                <c:pt idx="121">
+                  <c:v>67</c:v>
+                </c:pt>
+                <c:pt idx="122">
+                  <c:v>34</c:v>
+                </c:pt>
+                <c:pt idx="123">
+                  <c:v>27</c:v>
+                </c:pt>
+                <c:pt idx="124">
+                  <c:v>22</c:v>
+                </c:pt>
+                <c:pt idx="125">
+                  <c:v>21</c:v>
+                </c:pt>
+                <c:pt idx="126">
+                  <c:v>21</c:v>
+                </c:pt>
+                <c:pt idx="127">
+                  <c:v>18</c:v>
+                </c:pt>
+                <c:pt idx="128">
+                  <c:v>36</c:v>
+                </c:pt>
+                <c:pt idx="129">
+                  <c:v>32</c:v>
+                </c:pt>
+                <c:pt idx="130">
+                  <c:v>25</c:v>
+                </c:pt>
+                <c:pt idx="131">
+                  <c:v>21</c:v>
+                </c:pt>
+                <c:pt idx="132">
+                  <c:v>15</c:v>
+                </c:pt>
+                <c:pt idx="133">
+                  <c:v>13</c:v>
+                </c:pt>
+                <c:pt idx="134">
+                  <c:v>13</c:v>
+                </c:pt>
+                <c:pt idx="135">
+                  <c:v>27</c:v>
+                </c:pt>
+                <c:pt idx="136">
+                  <c:v>25</c:v>
+                </c:pt>
+                <c:pt idx="137">
+                  <c:v>24</c:v>
+                </c:pt>
+                <c:pt idx="138">
+                  <c:v>20</c:v>
+                </c:pt>
+                <c:pt idx="139">
+                  <c:v>19</c:v>
+                </c:pt>
+                <c:pt idx="140">
+                  <c:v>24</c:v>
+                </c:pt>
+                <c:pt idx="141">
+                  <c:v>21</c:v>
+                </c:pt>
+                <c:pt idx="142">
+                  <c:v>20</c:v>
+                </c:pt>
+                <c:pt idx="143">
+                  <c:v>20</c:v>
+                </c:pt>
+                <c:pt idx="144">
+                  <c:v>23</c:v>
+                </c:pt>
+                <c:pt idx="145">
+                  <c:v>23</c:v>
+                </c:pt>
+                <c:pt idx="146">
+                  <c:v>22</c:v>
+                </c:pt>
+                <c:pt idx="147">
+                  <c:v>21</c:v>
+                </c:pt>
+                <c:pt idx="148">
+                  <c:v>18</c:v>
+                </c:pt>
+                <c:pt idx="149">
+                  <c:v>17</c:v>
+                </c:pt>
+                <c:pt idx="150">
+                  <c:v>12</c:v>
+                </c:pt>
+                <c:pt idx="151">
+                  <c:v>31</c:v>
+                </c:pt>
+                <c:pt idx="152">
+                  <c:v>27</c:v>
+                </c:pt>
+                <c:pt idx="153">
+                  <c:v>21</c:v>
+                </c:pt>
+                <c:pt idx="154">
+                  <c:v>17</c:v>
+                </c:pt>
+                <c:pt idx="155">
+                  <c:v>17</c:v>
+                </c:pt>
+                <c:pt idx="156">
+                  <c:v>15</c:v>
+                </c:pt>
+                <c:pt idx="157">
+                  <c:v>27</c:v>
+                </c:pt>
+                <c:pt idx="158">
+                  <c:v>26</c:v>
+                </c:pt>
+                <c:pt idx="159">
+                  <c:v>25</c:v>
+                </c:pt>
+                <c:pt idx="160">
+                  <c:v>20</c:v>
+                </c:pt>
+                <c:pt idx="161">
+                  <c:v>19</c:v>
+                </c:pt>
+                <c:pt idx="162">
+                  <c:v>10</c:v>
+                </c:pt>
+                <c:pt idx="163">
+                  <c:v>41</c:v>
+                </c:pt>
+                <c:pt idx="164">
+                  <c:v>37</c:v>
+                </c:pt>
+                <c:pt idx="165">
+                  <c:v>21</c:v>
+                </c:pt>
+                <c:pt idx="166">
+                  <c:v>17</c:v>
+                </c:pt>
+                <c:pt idx="167">
+                  <c:v>17</c:v>
+                </c:pt>
+                <c:pt idx="168">
+                  <c:v>16</c:v>
+                </c:pt>
+                <c:pt idx="169">
+                  <c:v>16</c:v>
+                </c:pt>
+                <c:pt idx="170">
+                  <c:v>14</c:v>
+                </c:pt>
+                <c:pt idx="171">
+                  <c:v>13</c:v>
+                </c:pt>
+                <c:pt idx="172">
+                  <c:v>10</c:v>
+                </c:pt>
+                <c:pt idx="173">
+                  <c:v>9</c:v>
+                </c:pt>
+                <c:pt idx="174">
+                  <c:v>28</c:v>
+                </c:pt>
+                <c:pt idx="175">
+                  <c:v>24</c:v>
+                </c:pt>
+                <c:pt idx="176">
+                  <c:v>23</c:v>
+                </c:pt>
+                <c:pt idx="177">
+                  <c:v>22</c:v>
+                </c:pt>
+                <c:pt idx="178">
+                  <c:v>19</c:v>
+                </c:pt>
+                <c:pt idx="179">
+                  <c:v>19</c:v>
+                </c:pt>
+                <c:pt idx="180">
+                  <c:v>17</c:v>
+                </c:pt>
+                <c:pt idx="181">
+                  <c:v>15</c:v>
+                </c:pt>
+                <c:pt idx="182">
+                  <c:v>15</c:v>
+                </c:pt>
+                <c:pt idx="183">
+                  <c:v>14</c:v>
+                </c:pt>
+                <c:pt idx="184">
+                  <c:v>12</c:v>
+                </c:pt>
+                <c:pt idx="185">
+                  <c:v>7</c:v>
+                </c:pt>
+                <c:pt idx="186">
+                  <c:v>34</c:v>
+                </c:pt>
+                <c:pt idx="187">
+                  <c:v>33</c:v>
+                </c:pt>
+                <c:pt idx="188">
+                  <c:v>24</c:v>
+                </c:pt>
+                <c:pt idx="189">
+                  <c:v>23</c:v>
+                </c:pt>
+                <c:pt idx="190">
+                  <c:v>18</c:v>
+                </c:pt>
+                <c:pt idx="191">
+                  <c:v>15</c:v>
+                </c:pt>
+                <c:pt idx="192">
+                  <c:v>12</c:v>
+                </c:pt>
+                <c:pt idx="193">
+                  <c:v>12</c:v>
+                </c:pt>
+                <c:pt idx="194">
+                  <c:v>12</c:v>
+                </c:pt>
+                <c:pt idx="195">
+                  <c:v>12</c:v>
+                </c:pt>
+                <c:pt idx="196">
+                  <c:v>10</c:v>
+                </c:pt>
+                <c:pt idx="197">
+                  <c:v>34</c:v>
+                </c:pt>
+                <c:pt idx="198">
+                  <c:v>22</c:v>
+                </c:pt>
+                <c:pt idx="199">
+                  <c:v>18</c:v>
+                </c:pt>
+                <c:pt idx="200">
+                  <c:v>17</c:v>
+                </c:pt>
+                <c:pt idx="201">
+                  <c:v>16</c:v>
+                </c:pt>
+                <c:pt idx="202">
+                  <c:v>13</c:v>
+                </c:pt>
+                <c:pt idx="203">
+                  <c:v>12</c:v>
+                </c:pt>
+                <c:pt idx="204">
+                  <c:v>12</c:v>
+                </c:pt>
+                <c:pt idx="205">
+                  <c:v>12</c:v>
+                </c:pt>
+                <c:pt idx="206">
+                  <c:v>11</c:v>
+                </c:pt>
+                <c:pt idx="207">
+                  <c:v>9</c:v>
+                </c:pt>
+                <c:pt idx="208">
+                  <c:v>8</c:v>
+                </c:pt>
+                <c:pt idx="209">
+                  <c:v>23</c:v>
+                </c:pt>
+                <c:pt idx="210">
+                  <c:v>20</c:v>
+                </c:pt>
+                <c:pt idx="211">
+                  <c:v>20</c:v>
+                </c:pt>
+                <c:pt idx="212">
+                  <c:v>19</c:v>
+                </c:pt>
+                <c:pt idx="213">
+                  <c:v>16</c:v>
+                </c:pt>
+                <c:pt idx="214">
+                  <c:v>15</c:v>
+                </c:pt>
+                <c:pt idx="215">
+                  <c:v>14</c:v>
+                </c:pt>
+                <c:pt idx="216">
+                  <c:v>13</c:v>
+                </c:pt>
+                <c:pt idx="217">
+                  <c:v>12</c:v>
+                </c:pt>
+                <c:pt idx="218">
+                  <c:v>12</c:v>
+                </c:pt>
+                <c:pt idx="219">
+                  <c:v>11</c:v>
+                </c:pt>
+                <c:pt idx="220">
+                  <c:v>10</c:v>
+                </c:pt>
+                <c:pt idx="221">
+                  <c:v>10</c:v>
+                </c:pt>
+                <c:pt idx="222">
+                  <c:v>9</c:v>
+                </c:pt>
+                <c:pt idx="223">
+                  <c:v>8</c:v>
+                </c:pt>
+                <c:pt idx="224">
+                  <c:v>20</c:v>
+                </c:pt>
+                <c:pt idx="225">
+                  <c:v>16</c:v>
+                </c:pt>
+                <c:pt idx="226">
+                  <c:v>13</c:v>
+                </c:pt>
+                <c:pt idx="227">
+                  <c:v>11</c:v>
+                </c:pt>
+                <c:pt idx="228">
+                  <c:v>11</c:v>
+                </c:pt>
+                <c:pt idx="229">
+                  <c:v>10</c:v>
+                </c:pt>
+                <c:pt idx="230">
+                  <c:v>7</c:v>
+                </c:pt>
+                <c:pt idx="231">
+                  <c:v>5</c:v>
+                </c:pt>
+                <c:pt idx="232">
+                  <c:v>19</c:v>
+                </c:pt>
+                <c:pt idx="233">
+                  <c:v>12</c:v>
+                </c:pt>
+                <c:pt idx="234">
+                  <c:v>12</c:v>
+                </c:pt>
+                <c:pt idx="235">
+                  <c:v>12</c:v>
+                </c:pt>
+                <c:pt idx="236">
+                  <c:v>12</c:v>
+                </c:pt>
+                <c:pt idx="237">
+                  <c:v>11</c:v>
+                </c:pt>
+                <c:pt idx="238">
+                  <c:v>10</c:v>
+                </c:pt>
+                <c:pt idx="239">
+                  <c:v>8</c:v>
+                </c:pt>
+                <c:pt idx="240">
+                  <c:v>8</c:v>
+                </c:pt>
+                <c:pt idx="241">
+                  <c:v>7</c:v>
+                </c:pt>
+                <c:pt idx="242">
+                  <c:v>6</c:v>
+                </c:pt>
+                <c:pt idx="243">
+                  <c:v>5</c:v>
+                </c:pt>
+                <c:pt idx="244">
+                  <c:v>33</c:v>
+                </c:pt>
+                <c:pt idx="245">
+                  <c:v>32</c:v>
+                </c:pt>
+                <c:pt idx="246">
+                  <c:v>10</c:v>
+                </c:pt>
+                <c:pt idx="247">
+                  <c:v>10</c:v>
+                </c:pt>
+                <c:pt idx="248">
+                  <c:v>9</c:v>
+                </c:pt>
+                <c:pt idx="249">
+                  <c:v>9</c:v>
+                </c:pt>
+                <c:pt idx="250">
+                  <c:v>9</c:v>
+                </c:pt>
+                <c:pt idx="251">
+                  <c:v>8</c:v>
+                </c:pt>
+                <c:pt idx="252">
+                  <c:v>8</c:v>
+                </c:pt>
+                <c:pt idx="253">
+                  <c:v>8</c:v>
+                </c:pt>
+                <c:pt idx="254">
+                  <c:v>8</c:v>
+                </c:pt>
+                <c:pt idx="255">
+                  <c:v>7</c:v>
+                </c:pt>
+                <c:pt idx="256">
+                  <c:v>7</c:v>
+                </c:pt>
+                <c:pt idx="257">
+                  <c:v>7</c:v>
+                </c:pt>
+                <c:pt idx="258">
+                  <c:v>6</c:v>
+                </c:pt>
+                <c:pt idx="259">
+                  <c:v>5</c:v>
+                </c:pt>
+                <c:pt idx="260">
+                  <c:v>9</c:v>
+                </c:pt>
+                <c:pt idx="261">
+                  <c:v>8</c:v>
+                </c:pt>
+                <c:pt idx="262">
+                  <c:v>8</c:v>
+                </c:pt>
+                <c:pt idx="263">
+                  <c:v>8</c:v>
+                </c:pt>
+                <c:pt idx="264">
+                  <c:v>8</c:v>
+                </c:pt>
+                <c:pt idx="265">
+                  <c:v>7</c:v>
+                </c:pt>
+                <c:pt idx="266">
+                  <c:v>7</c:v>
+                </c:pt>
+                <c:pt idx="267">
+                  <c:v>6</c:v>
+                </c:pt>
+                <c:pt idx="268">
+                  <c:v>6</c:v>
+                </c:pt>
+                <c:pt idx="269">
+                  <c:v>5</c:v>
+                </c:pt>
+                <c:pt idx="270">
+                  <c:v>5</c:v>
+                </c:pt>
+                <c:pt idx="271">
+                  <c:v>5</c:v>
+                </c:pt>
+                <c:pt idx="272">
+                  <c:v>4</c:v>
+                </c:pt>
+                <c:pt idx="273">
+                  <c:v>4</c:v>
+                </c:pt>
+                <c:pt idx="274">
+                  <c:v>15</c:v>
+                </c:pt>
+                <c:pt idx="275">
+                  <c:v>14</c:v>
+                </c:pt>
+                <c:pt idx="276">
+                  <c:v>11</c:v>
+                </c:pt>
+                <c:pt idx="277">
+                  <c:v>11</c:v>
+                </c:pt>
+                <c:pt idx="278">
+                  <c:v>11</c:v>
+                </c:pt>
+                <c:pt idx="279">
+                  <c:v>10</c:v>
+                </c:pt>
+                <c:pt idx="280">
+                  <c:v>10</c:v>
+                </c:pt>
+                <c:pt idx="281">
+                  <c:v>8</c:v>
+                </c:pt>
+                <c:pt idx="282">
+                  <c:v>8</c:v>
+                </c:pt>
+                <c:pt idx="283">
+                  <c:v>6</c:v>
+                </c:pt>
+                <c:pt idx="284">
+                  <c:v>6</c:v>
+                </c:pt>
+                <c:pt idx="285">
+                  <c:v>5</c:v>
+                </c:pt>
+                <c:pt idx="286">
+                  <c:v>5</c:v>
+                </c:pt>
+                <c:pt idx="287">
+                  <c:v>5</c:v>
+                </c:pt>
+                <c:pt idx="288">
+                  <c:v>5</c:v>
+                </c:pt>
+                <c:pt idx="289">
+                  <c:v>5</c:v>
+                </c:pt>
+                <c:pt idx="290">
+                  <c:v>5</c:v>
+                </c:pt>
+                <c:pt idx="291">
+                  <c:v>4</c:v>
+                </c:pt>
+                <c:pt idx="292">
+                  <c:v>4</c:v>
+                </c:pt>
+                <c:pt idx="293">
+                  <c:v>4</c:v>
+                </c:pt>
+                <c:pt idx="294">
+                  <c:v>4</c:v>
+                </c:pt>
+                <c:pt idx="295">
+                  <c:v>3</c:v>
+                </c:pt>
+                <c:pt idx="296">
+                  <c:v>3</c:v>
+                </c:pt>
+                <c:pt idx="297">
+                  <c:v>3</c:v>
+                </c:pt>
+                <c:pt idx="298">
+                  <c:v>34</c:v>
+                </c:pt>
+                <c:pt idx="299">
+                  <c:v>26</c:v>
+                </c:pt>
+                <c:pt idx="300">
+                  <c:v>8</c:v>
+                </c:pt>
+                <c:pt idx="301">
+                  <c:v>6</c:v>
+                </c:pt>
+                <c:pt idx="302">
+                  <c:v>5</c:v>
+                </c:pt>
+                <c:pt idx="303">
+                  <c:v>5</c:v>
+                </c:pt>
+                <c:pt idx="304">
+                  <c:v>4</c:v>
+                </c:pt>
+                <c:pt idx="305">
+                  <c:v>4</c:v>
+                </c:pt>
+                <c:pt idx="306">
+                  <c:v>4</c:v>
+                </c:pt>
+                <c:pt idx="307">
+                  <c:v>3</c:v>
+                </c:pt>
+                <c:pt idx="308">
+                  <c:v>14</c:v>
+                </c:pt>
+                <c:pt idx="309">
+                  <c:v>6</c:v>
+                </c:pt>
+                <c:pt idx="310">
+                  <c:v>5</c:v>
+                </c:pt>
+                <c:pt idx="311">
+                  <c:v>5</c:v>
+                </c:pt>
+                <c:pt idx="312">
+                  <c:v>4</c:v>
+                </c:pt>
+                <c:pt idx="313">
+                  <c:v>4</c:v>
+                </c:pt>
+                <c:pt idx="314">
+                  <c:v>4</c:v>
+                </c:pt>
+                <c:pt idx="315">
+                  <c:v>3</c:v>
+                </c:pt>
+                <c:pt idx="316">
+                  <c:v>3</c:v>
+                </c:pt>
+                <c:pt idx="317">
+                  <c:v>3</c:v>
+                </c:pt>
+                <c:pt idx="318">
+                  <c:v>2</c:v>
+                </c:pt>
+                <c:pt idx="319">
+                  <c:v>2</c:v>
+                </c:pt>
+                <c:pt idx="320">
+                  <c:v>2</c:v>
+                </c:pt>
+                <c:pt idx="321">
+                  <c:v>2</c:v>
+                </c:pt>
+                <c:pt idx="322">
+                  <c:v>2</c:v>
+                </c:pt>
+                <c:pt idx="323">
+                  <c:v>2</c:v>
+                </c:pt>
+                <c:pt idx="324">
+                  <c:v>2</c:v>
+                </c:pt>
+                <c:pt idx="325">
+                  <c:v>2</c:v>
+                </c:pt>
+                <c:pt idx="326">
+                  <c:v>2</c:v>
+                </c:pt>
+                <c:pt idx="327">
+                  <c:v>2</c:v>
+                </c:pt>
+                <c:pt idx="328">
+                  <c:v>2</c:v>
+                </c:pt>
+                <c:pt idx="329">
+                  <c:v>2</c:v>
+                </c:pt>
+                <c:pt idx="330">
+                  <c:v>2</c:v>
+                </c:pt>
+                <c:pt idx="331">
+                  <c:v>2</c:v>
+                </c:pt>
+                <c:pt idx="332">
+                  <c:v>2</c:v>
+                </c:pt>
+                <c:pt idx="333">
+                  <c:v>20</c:v>
+                </c:pt>
+                <c:pt idx="334">
+                  <c:v>8</c:v>
+                </c:pt>
+                <c:pt idx="335">
+                  <c:v>8</c:v>
+                </c:pt>
+                <c:pt idx="336">
+                  <c:v>3</c:v>
+                </c:pt>
+                <c:pt idx="337">
+                  <c:v>3</c:v>
+                </c:pt>
+                <c:pt idx="338">
+                  <c:v>3</c:v>
+                </c:pt>
+                <c:pt idx="339">
+                  <c:v>3</c:v>
+                </c:pt>
+                <c:pt idx="340">
+                  <c:v>3</c:v>
+                </c:pt>
+                <c:pt idx="341">
+                  <c:v>2</c:v>
+                </c:pt>
+                <c:pt idx="342">
+                  <c:v>2</c:v>
+                </c:pt>
+                <c:pt idx="343">
+                  <c:v>2</c:v>
+                </c:pt>
+                <c:pt idx="344">
+                  <c:v>2</c:v>
+                </c:pt>
+                <c:pt idx="345">
+                  <c:v>2</c:v>
+                </c:pt>
+                <c:pt idx="346">
+                  <c:v>2</c:v>
+                </c:pt>
+                <c:pt idx="347">
+                  <c:v>2</c:v>
+                </c:pt>
+                <c:pt idx="348">
+                  <c:v>2</c:v>
+                </c:pt>
+                <c:pt idx="349">
+                  <c:v>2</c:v>
+                </c:pt>
+                <c:pt idx="350">
+                  <c:v>2</c:v>
+                </c:pt>
+              </c:numCache>
+            </c:numRef>
+          </c:xVal>
+          <c:yVal>
+            <c:numRef>
+              <c:f>'data-export1'!$C$2:$C$352</c:f>
+              <c:numCache>
+                <c:formatCode>General</c:formatCode>
+                <c:ptCount val="351"/>
+                <c:pt idx="0">
+                  <c:v>0</c:v>
+                </c:pt>
+                <c:pt idx="1">
+                  <c:v>71</c:v>
+                </c:pt>
+                <c:pt idx="2">
+                  <c:v>68</c:v>
+                </c:pt>
+                <c:pt idx="3">
+                  <c:v>68</c:v>
+                </c:pt>
+                <c:pt idx="4">
+                  <c:v>67</c:v>
+                </c:pt>
+                <c:pt idx="5">
+                  <c:v>66</c:v>
+                </c:pt>
+                <c:pt idx="6">
+                  <c:v>66</c:v>
+                </c:pt>
+                <c:pt idx="7">
+                  <c:v>66</c:v>
+                </c:pt>
+                <c:pt idx="8">
+                  <c:v>65</c:v>
+                </c:pt>
+                <c:pt idx="9">
+                  <c:v>65</c:v>
+                </c:pt>
+                <c:pt idx="10">
+                  <c:v>65</c:v>
+                </c:pt>
+                <c:pt idx="11">
+                  <c:v>65</c:v>
+                </c:pt>
+                <c:pt idx="12">
+                  <c:v>63</c:v>
+                </c:pt>
+                <c:pt idx="13">
+                  <c:v>62</c:v>
+                </c:pt>
+                <c:pt idx="14">
+                  <c:v>62</c:v>
+                </c:pt>
+                <c:pt idx="15">
+                  <c:v>62</c:v>
+                </c:pt>
+                <c:pt idx="16">
+                  <c:v>61</c:v>
+                </c:pt>
+                <c:pt idx="17">
+                  <c:v>61</c:v>
+                </c:pt>
+                <c:pt idx="18">
+                  <c:v>61</c:v>
+                </c:pt>
+                <c:pt idx="19">
+                  <c:v>61</c:v>
+                </c:pt>
+                <c:pt idx="20">
+                  <c:v>60</c:v>
+                </c:pt>
+                <c:pt idx="21">
+                  <c:v>60</c:v>
+                </c:pt>
+                <c:pt idx="22">
+                  <c:v>60</c:v>
+                </c:pt>
+                <c:pt idx="23">
+                  <c:v>60</c:v>
+                </c:pt>
+                <c:pt idx="24">
+                  <c:v>59</c:v>
+                </c:pt>
+                <c:pt idx="25">
+                  <c:v>58</c:v>
+                </c:pt>
+                <c:pt idx="26">
+                  <c:v>58</c:v>
+                </c:pt>
+                <c:pt idx="27">
+                  <c:v>58</c:v>
+                </c:pt>
+                <c:pt idx="28">
+                  <c:v>58</c:v>
+                </c:pt>
+                <c:pt idx="29">
+                  <c:v>58</c:v>
+                </c:pt>
+                <c:pt idx="30">
+                  <c:v>58</c:v>
+                </c:pt>
+                <c:pt idx="31">
+                  <c:v>57</c:v>
+                </c:pt>
+                <c:pt idx="32">
+                  <c:v>57</c:v>
+                </c:pt>
+                <c:pt idx="33">
+                  <c:v>57</c:v>
+                </c:pt>
+                <c:pt idx="34">
+                  <c:v>57</c:v>
+                </c:pt>
+                <c:pt idx="35">
+                  <c:v>57</c:v>
+                </c:pt>
+                <c:pt idx="36">
+                  <c:v>56</c:v>
+                </c:pt>
+                <c:pt idx="37">
+                  <c:v>56</c:v>
+                </c:pt>
+                <c:pt idx="38">
+                  <c:v>56</c:v>
+                </c:pt>
+                <c:pt idx="39">
+                  <c:v>55</c:v>
+                </c:pt>
+                <c:pt idx="40">
+                  <c:v>55</c:v>
+                </c:pt>
+                <c:pt idx="41">
+                  <c:v>53</c:v>
+                </c:pt>
+                <c:pt idx="42">
+                  <c:v>51</c:v>
+                </c:pt>
+                <c:pt idx="43">
+                  <c:v>51</c:v>
+                </c:pt>
+                <c:pt idx="44">
+                  <c:v>51</c:v>
+                </c:pt>
+                <c:pt idx="45">
+                  <c:v>50</c:v>
+                </c:pt>
+                <c:pt idx="46">
+                  <c:v>50</c:v>
+                </c:pt>
+                <c:pt idx="47">
+                  <c:v>49</c:v>
+                </c:pt>
+                <c:pt idx="48">
+                  <c:v>49</c:v>
+                </c:pt>
+                <c:pt idx="49">
+                  <c:v>46</c:v>
+                </c:pt>
+                <c:pt idx="50">
+                  <c:v>46</c:v>
+                </c:pt>
+                <c:pt idx="51">
+                  <c:v>43</c:v>
+                </c:pt>
+                <c:pt idx="52">
+                  <c:v>43</c:v>
+                </c:pt>
+                <c:pt idx="53">
+                  <c:v>43</c:v>
+                </c:pt>
+                <c:pt idx="54">
+                  <c:v>43</c:v>
+                </c:pt>
+                <c:pt idx="55">
+                  <c:v>42</c:v>
+                </c:pt>
+                <c:pt idx="56">
+                  <c:v>42</c:v>
+                </c:pt>
+                <c:pt idx="57">
+                  <c:v>41</c:v>
+                </c:pt>
+                <c:pt idx="58">
+                  <c:v>40</c:v>
+                </c:pt>
+                <c:pt idx="59">
+                  <c:v>40</c:v>
+                </c:pt>
+                <c:pt idx="60">
+                  <c:v>40</c:v>
+                </c:pt>
+                <c:pt idx="61">
+                  <c:v>40</c:v>
+                </c:pt>
+                <c:pt idx="62">
+                  <c:v>39</c:v>
+                </c:pt>
+                <c:pt idx="63">
+                  <c:v>38</c:v>
+                </c:pt>
+                <c:pt idx="64">
+                  <c:v>37</c:v>
+                </c:pt>
+                <c:pt idx="65">
+                  <c:v>37</c:v>
+                </c:pt>
+                <c:pt idx="66">
+                  <c:v>37</c:v>
+                </c:pt>
+                <c:pt idx="67">
+                  <c:v>36</c:v>
+                </c:pt>
+                <c:pt idx="68">
+                  <c:v>35</c:v>
+                </c:pt>
+                <c:pt idx="69">
+                  <c:v>35</c:v>
+                </c:pt>
+                <c:pt idx="70">
+                  <c:v>35</c:v>
+                </c:pt>
+                <c:pt idx="71">
+                  <c:v>33</c:v>
+                </c:pt>
+                <c:pt idx="72">
+                  <c:v>32</c:v>
+                </c:pt>
+                <c:pt idx="73">
+                  <c:v>31</c:v>
+                </c:pt>
+                <c:pt idx="74">
+                  <c:v>31</c:v>
+                </c:pt>
+                <c:pt idx="75">
+                  <c:v>31</c:v>
+                </c:pt>
+                <c:pt idx="76">
+                  <c:v>30</c:v>
+                </c:pt>
+                <c:pt idx="77">
+                  <c:v>30</c:v>
+                </c:pt>
+                <c:pt idx="78">
+                  <c:v>30</c:v>
+                </c:pt>
+                <c:pt idx="79">
+                  <c:v>30</c:v>
+                </c:pt>
+                <c:pt idx="80">
+                  <c:v>29</c:v>
+                </c:pt>
+                <c:pt idx="81">
+                  <c:v>29</c:v>
+                </c:pt>
+                <c:pt idx="82">
+                  <c:v>29</c:v>
+                </c:pt>
+                <c:pt idx="83">
+                  <c:v>29</c:v>
+                </c:pt>
+                <c:pt idx="84">
+                  <c:v>29</c:v>
+                </c:pt>
+                <c:pt idx="85">
+                  <c:v>28</c:v>
+                </c:pt>
+                <c:pt idx="86">
+                  <c:v>28</c:v>
+                </c:pt>
+                <c:pt idx="87">
+                  <c:v>28</c:v>
+                </c:pt>
+                <c:pt idx="88">
+                  <c:v>27</c:v>
+                </c:pt>
+                <c:pt idx="89">
+                  <c:v>27</c:v>
+                </c:pt>
+                <c:pt idx="90">
+                  <c:v>27</c:v>
+                </c:pt>
+                <c:pt idx="91">
+                  <c:v>27</c:v>
+                </c:pt>
+                <c:pt idx="92">
+                  <c:v>27</c:v>
+                </c:pt>
+                <c:pt idx="93">
+                  <c:v>27</c:v>
+                </c:pt>
+                <c:pt idx="94">
+                  <c:v>27</c:v>
+                </c:pt>
+                <c:pt idx="95">
+                  <c:v>25</c:v>
+                </c:pt>
+                <c:pt idx="96">
+                  <c:v>25</c:v>
+                </c:pt>
+                <c:pt idx="97">
+                  <c:v>25</c:v>
+                </c:pt>
+                <c:pt idx="98">
+                  <c:v>25</c:v>
+                </c:pt>
+                <c:pt idx="99">
+                  <c:v>25</c:v>
+                </c:pt>
+                <c:pt idx="100">
+                  <c:v>25</c:v>
+                </c:pt>
+                <c:pt idx="101">
+                  <c:v>25</c:v>
+                </c:pt>
+                <c:pt idx="102">
+                  <c:v>24</c:v>
+                </c:pt>
+                <c:pt idx="103">
+                  <c:v>24</c:v>
+                </c:pt>
+                <c:pt idx="104">
+                  <c:v>24</c:v>
+                </c:pt>
+                <c:pt idx="105">
+                  <c:v>24</c:v>
+                </c:pt>
+                <c:pt idx="106">
+                  <c:v>24</c:v>
+                </c:pt>
+                <c:pt idx="107">
+                  <c:v>24</c:v>
+                </c:pt>
+                <c:pt idx="108">
+                  <c:v>24</c:v>
+                </c:pt>
+                <c:pt idx="109">
+                  <c:v>23</c:v>
+                </c:pt>
+                <c:pt idx="110">
+                  <c:v>23</c:v>
+                </c:pt>
+                <c:pt idx="111">
+                  <c:v>23</c:v>
+                </c:pt>
+                <c:pt idx="112">
+                  <c:v>23</c:v>
+                </c:pt>
+                <c:pt idx="113">
+                  <c:v>23</c:v>
+                </c:pt>
+                <c:pt idx="114">
+                  <c:v>23</c:v>
+                </c:pt>
+                <c:pt idx="115">
+                  <c:v>23</c:v>
+                </c:pt>
+                <c:pt idx="116">
+                  <c:v>22</c:v>
+                </c:pt>
+                <c:pt idx="117">
+                  <c:v>22</c:v>
+                </c:pt>
+                <c:pt idx="118">
+                  <c:v>21</c:v>
+                </c:pt>
+                <c:pt idx="119">
+                  <c:v>21</c:v>
+                </c:pt>
+                <c:pt idx="120">
+                  <c:v>21</c:v>
+                </c:pt>
+                <c:pt idx="121">
+                  <c:v>20</c:v>
+                </c:pt>
+                <c:pt idx="122">
+                  <c:v>20</c:v>
+                </c:pt>
+                <c:pt idx="123">
+                  <c:v>20</c:v>
+                </c:pt>
+                <c:pt idx="124">
+                  <c:v>20</c:v>
+                </c:pt>
+                <c:pt idx="125">
+                  <c:v>20</c:v>
+                </c:pt>
+                <c:pt idx="126">
+                  <c:v>20</c:v>
+                </c:pt>
+                <c:pt idx="127">
+                  <c:v>20</c:v>
+                </c:pt>
+                <c:pt idx="128">
+                  <c:v>19</c:v>
+                </c:pt>
+                <c:pt idx="129">
+                  <c:v>19</c:v>
+                </c:pt>
+                <c:pt idx="130">
+                  <c:v>19</c:v>
+                </c:pt>
+                <c:pt idx="131">
+                  <c:v>19</c:v>
+                </c:pt>
+                <c:pt idx="132">
+                  <c:v>19</c:v>
+                </c:pt>
+                <c:pt idx="133">
+                  <c:v>19</c:v>
+                </c:pt>
+                <c:pt idx="134">
+                  <c:v>19</c:v>
+                </c:pt>
+                <c:pt idx="135">
+                  <c:v>18</c:v>
+                </c:pt>
+                <c:pt idx="136">
+                  <c:v>18</c:v>
+                </c:pt>
+                <c:pt idx="137">
+                  <c:v>18</c:v>
+                </c:pt>
+                <c:pt idx="138">
+                  <c:v>18</c:v>
+                </c:pt>
+                <c:pt idx="139">
+                  <c:v>18</c:v>
+                </c:pt>
+                <c:pt idx="140">
+                  <c:v>17</c:v>
+                </c:pt>
+                <c:pt idx="141">
+                  <c:v>17</c:v>
+                </c:pt>
+                <c:pt idx="142">
+                  <c:v>17</c:v>
+                </c:pt>
+                <c:pt idx="143">
+                  <c:v>17</c:v>
+                </c:pt>
+                <c:pt idx="144">
+                  <c:v>16</c:v>
+                </c:pt>
+                <c:pt idx="145">
+                  <c:v>16</c:v>
+                </c:pt>
+                <c:pt idx="146">
+                  <c:v>16</c:v>
+                </c:pt>
+                <c:pt idx="147">
+                  <c:v>16</c:v>
+                </c:pt>
+                <c:pt idx="148">
+                  <c:v>16</c:v>
+                </c:pt>
+                <c:pt idx="149">
+                  <c:v>16</c:v>
+                </c:pt>
+                <c:pt idx="150">
+                  <c:v>16</c:v>
+                </c:pt>
+                <c:pt idx="151">
+                  <c:v>15</c:v>
+                </c:pt>
+                <c:pt idx="152">
+                  <c:v>15</c:v>
+                </c:pt>
+                <c:pt idx="153">
+                  <c:v>15</c:v>
+                </c:pt>
+                <c:pt idx="154">
+                  <c:v>15</c:v>
+                </c:pt>
+                <c:pt idx="155">
+                  <c:v>15</c:v>
+                </c:pt>
+                <c:pt idx="156">
+                  <c:v>15</c:v>
+                </c:pt>
+                <c:pt idx="157">
+                  <c:v>14</c:v>
+                </c:pt>
+                <c:pt idx="158">
+                  <c:v>14</c:v>
+                </c:pt>
+                <c:pt idx="159">
+                  <c:v>14</c:v>
+                </c:pt>
+                <c:pt idx="160">
+                  <c:v>14</c:v>
+                </c:pt>
+                <c:pt idx="161">
+                  <c:v>14</c:v>
+                </c:pt>
+                <c:pt idx="162">
+                  <c:v>14</c:v>
+                </c:pt>
+                <c:pt idx="163">
+                  <c:v>13</c:v>
+                </c:pt>
+                <c:pt idx="164">
+                  <c:v>13</c:v>
+                </c:pt>
+                <c:pt idx="165">
+                  <c:v>13</c:v>
+                </c:pt>
+                <c:pt idx="166">
+                  <c:v>13</c:v>
+                </c:pt>
+                <c:pt idx="167">
+                  <c:v>13</c:v>
+                </c:pt>
+                <c:pt idx="168">
+                  <c:v>13</c:v>
+                </c:pt>
+                <c:pt idx="169">
+                  <c:v>13</c:v>
+                </c:pt>
+                <c:pt idx="170">
+                  <c:v>13</c:v>
+                </c:pt>
+                <c:pt idx="171">
+                  <c:v>13</c:v>
+                </c:pt>
+                <c:pt idx="172">
+                  <c:v>13</c:v>
+                </c:pt>
+                <c:pt idx="173">
+                  <c:v>13</c:v>
+                </c:pt>
+                <c:pt idx="174">
+                  <c:v>12</c:v>
+                </c:pt>
+                <c:pt idx="175">
+                  <c:v>12</c:v>
+                </c:pt>
+                <c:pt idx="176">
+                  <c:v>12</c:v>
+                </c:pt>
+                <c:pt idx="177">
+                  <c:v>12</c:v>
+                </c:pt>
+                <c:pt idx="178">
+                  <c:v>12</c:v>
+                </c:pt>
+                <c:pt idx="179">
+                  <c:v>12</c:v>
+                </c:pt>
+                <c:pt idx="180">
+                  <c:v>12</c:v>
+                </c:pt>
+                <c:pt idx="181">
+                  <c:v>12</c:v>
+                </c:pt>
+                <c:pt idx="182">
+                  <c:v>12</c:v>
+                </c:pt>
+                <c:pt idx="183">
+                  <c:v>12</c:v>
+                </c:pt>
+                <c:pt idx="184">
+                  <c:v>12</c:v>
+                </c:pt>
+                <c:pt idx="185">
+                  <c:v>12</c:v>
+                </c:pt>
+                <c:pt idx="186">
+                  <c:v>11</c:v>
+                </c:pt>
+                <c:pt idx="187">
+                  <c:v>11</c:v>
+                </c:pt>
+                <c:pt idx="188">
+                  <c:v>11</c:v>
+                </c:pt>
+                <c:pt idx="189">
+                  <c:v>11</c:v>
+                </c:pt>
+                <c:pt idx="190">
+                  <c:v>11</c:v>
+                </c:pt>
+                <c:pt idx="191">
+                  <c:v>11</c:v>
+                </c:pt>
+                <c:pt idx="192">
+                  <c:v>11</c:v>
+                </c:pt>
+                <c:pt idx="193">
+                  <c:v>11</c:v>
+                </c:pt>
+                <c:pt idx="194">
+                  <c:v>11</c:v>
+                </c:pt>
+                <c:pt idx="195">
+                  <c:v>11</c:v>
+                </c:pt>
+                <c:pt idx="196">
+                  <c:v>11</c:v>
+                </c:pt>
+                <c:pt idx="197">
+                  <c:v>10</c:v>
+                </c:pt>
+                <c:pt idx="198">
+                  <c:v>10</c:v>
+                </c:pt>
+                <c:pt idx="199">
+                  <c:v>10</c:v>
+                </c:pt>
+                <c:pt idx="200">
+                  <c:v>10</c:v>
+                </c:pt>
+                <c:pt idx="201">
+                  <c:v>10</c:v>
+                </c:pt>
+                <c:pt idx="202">
+                  <c:v>10</c:v>
+                </c:pt>
+                <c:pt idx="203">
+                  <c:v>10</c:v>
+                </c:pt>
+                <c:pt idx="204">
+                  <c:v>10</c:v>
+                </c:pt>
+                <c:pt idx="205">
+                  <c:v>10</c:v>
+                </c:pt>
+                <c:pt idx="206">
+                  <c:v>10</c:v>
+                </c:pt>
+                <c:pt idx="207">
+                  <c:v>10</c:v>
+                </c:pt>
+                <c:pt idx="208">
+                  <c:v>10</c:v>
+                </c:pt>
+                <c:pt idx="209">
+                  <c:v>9</c:v>
+                </c:pt>
+                <c:pt idx="210">
+                  <c:v>9</c:v>
+                </c:pt>
+                <c:pt idx="211">
+                  <c:v>9</c:v>
+                </c:pt>
+                <c:pt idx="212">
+                  <c:v>9</c:v>
+                </c:pt>
+                <c:pt idx="213">
+                  <c:v>9</c:v>
+                </c:pt>
+                <c:pt idx="214">
+                  <c:v>9</c:v>
+                </c:pt>
+                <c:pt idx="215">
+                  <c:v>9</c:v>
+                </c:pt>
+                <c:pt idx="216">
+                  <c:v>9</c:v>
+                </c:pt>
+                <c:pt idx="217">
+                  <c:v>9</c:v>
+                </c:pt>
+                <c:pt idx="218">
+                  <c:v>9</c:v>
+                </c:pt>
+                <c:pt idx="219">
+                  <c:v>9</c:v>
+                </c:pt>
+                <c:pt idx="220">
+                  <c:v>9</c:v>
+                </c:pt>
+                <c:pt idx="221">
+                  <c:v>9</c:v>
+                </c:pt>
+                <c:pt idx="222">
+                  <c:v>9</c:v>
+                </c:pt>
+                <c:pt idx="223">
+                  <c:v>9</c:v>
+                </c:pt>
+                <c:pt idx="224">
+                  <c:v>8</c:v>
+                </c:pt>
+                <c:pt idx="225">
+                  <c:v>8</c:v>
+                </c:pt>
+                <c:pt idx="226">
+                  <c:v>8</c:v>
+                </c:pt>
+                <c:pt idx="227">
+                  <c:v>8</c:v>
+                </c:pt>
+                <c:pt idx="228">
+                  <c:v>8</c:v>
+                </c:pt>
+                <c:pt idx="229">
+                  <c:v>8</c:v>
+                </c:pt>
+                <c:pt idx="230">
+                  <c:v>8</c:v>
+                </c:pt>
+                <c:pt idx="231">
+                  <c:v>8</c:v>
+                </c:pt>
+                <c:pt idx="232">
+                  <c:v>7</c:v>
+                </c:pt>
+                <c:pt idx="233">
+                  <c:v>7</c:v>
+                </c:pt>
+                <c:pt idx="234">
+                  <c:v>7</c:v>
+                </c:pt>
+                <c:pt idx="235">
+                  <c:v>7</c:v>
+                </c:pt>
+                <c:pt idx="236">
+                  <c:v>7</c:v>
+                </c:pt>
+                <c:pt idx="237">
+                  <c:v>7</c:v>
+                </c:pt>
+                <c:pt idx="238">
+                  <c:v>7</c:v>
+                </c:pt>
+                <c:pt idx="239">
+                  <c:v>7</c:v>
+                </c:pt>
+                <c:pt idx="240">
+                  <c:v>7</c:v>
+                </c:pt>
+                <c:pt idx="241">
+                  <c:v>7</c:v>
+                </c:pt>
+                <c:pt idx="242">
+                  <c:v>7</c:v>
+                </c:pt>
+                <c:pt idx="243">
+                  <c:v>7</c:v>
+                </c:pt>
+                <c:pt idx="244">
+                  <c:v>6</c:v>
+                </c:pt>
+                <c:pt idx="245">
+                  <c:v>6</c:v>
+                </c:pt>
+                <c:pt idx="246">
+                  <c:v>6</c:v>
+                </c:pt>
+                <c:pt idx="247">
+                  <c:v>6</c:v>
+                </c:pt>
+                <c:pt idx="248">
+                  <c:v>6</c:v>
+                </c:pt>
+                <c:pt idx="249">
+                  <c:v>6</c:v>
+                </c:pt>
+                <c:pt idx="250">
+                  <c:v>6</c:v>
+                </c:pt>
+                <c:pt idx="251">
+                  <c:v>6</c:v>
+                </c:pt>
+                <c:pt idx="252">
+                  <c:v>6</c:v>
+                </c:pt>
+                <c:pt idx="253">
+                  <c:v>6</c:v>
+                </c:pt>
+                <c:pt idx="254">
+                  <c:v>6</c:v>
+                </c:pt>
+                <c:pt idx="255">
+                  <c:v>6</c:v>
+                </c:pt>
+                <c:pt idx="256">
+                  <c:v>6</c:v>
+                </c:pt>
+                <c:pt idx="257">
+                  <c:v>6</c:v>
+                </c:pt>
+                <c:pt idx="258">
+                  <c:v>6</c:v>
+                </c:pt>
+                <c:pt idx="259">
+                  <c:v>6</c:v>
+                </c:pt>
+                <c:pt idx="260">
+                  <c:v>5</c:v>
+                </c:pt>
+                <c:pt idx="261">
+                  <c:v>5</c:v>
+                </c:pt>
+                <c:pt idx="262">
+                  <c:v>5</c:v>
+                </c:pt>
+                <c:pt idx="263">
+                  <c:v>5</c:v>
+                </c:pt>
+                <c:pt idx="264">
+                  <c:v>5</c:v>
+                </c:pt>
+                <c:pt idx="265">
+                  <c:v>5</c:v>
+                </c:pt>
+                <c:pt idx="266">
+                  <c:v>5</c:v>
+                </c:pt>
+                <c:pt idx="267">
+                  <c:v>5</c:v>
+                </c:pt>
+                <c:pt idx="268">
+                  <c:v>5</c:v>
+                </c:pt>
+                <c:pt idx="269">
+                  <c:v>5</c:v>
+                </c:pt>
+                <c:pt idx="270">
+                  <c:v>5</c:v>
+                </c:pt>
+                <c:pt idx="271">
+                  <c:v>5</c:v>
+                </c:pt>
+                <c:pt idx="272">
+                  <c:v>5</c:v>
+                </c:pt>
+                <c:pt idx="273">
+                  <c:v>5</c:v>
+                </c:pt>
+                <c:pt idx="274">
+                  <c:v>4</c:v>
+                </c:pt>
+                <c:pt idx="275">
+                  <c:v>4</c:v>
+                </c:pt>
+                <c:pt idx="276">
+                  <c:v>4</c:v>
+                </c:pt>
+                <c:pt idx="277">
+                  <c:v>4</c:v>
+                </c:pt>
+                <c:pt idx="278">
+                  <c:v>4</c:v>
+                </c:pt>
+                <c:pt idx="279">
+                  <c:v>4</c:v>
+                </c:pt>
+                <c:pt idx="280">
+                  <c:v>4</c:v>
+                </c:pt>
+                <c:pt idx="281">
+                  <c:v>4</c:v>
+                </c:pt>
+                <c:pt idx="282">
+                  <c:v>4</c:v>
+                </c:pt>
+                <c:pt idx="283">
+                  <c:v>4</c:v>
+                </c:pt>
+                <c:pt idx="284">
+                  <c:v>4</c:v>
+                </c:pt>
+                <c:pt idx="285">
+                  <c:v>4</c:v>
+                </c:pt>
+                <c:pt idx="286">
+                  <c:v>4</c:v>
+                </c:pt>
+                <c:pt idx="287">
+                  <c:v>4</c:v>
+                </c:pt>
+                <c:pt idx="288">
+                  <c:v>4</c:v>
+                </c:pt>
+                <c:pt idx="289">
+                  <c:v>4</c:v>
+                </c:pt>
+                <c:pt idx="290">
+                  <c:v>4</c:v>
+                </c:pt>
+                <c:pt idx="291">
+                  <c:v>4</c:v>
+                </c:pt>
+                <c:pt idx="292">
+                  <c:v>4</c:v>
+                </c:pt>
+                <c:pt idx="293">
+                  <c:v>4</c:v>
+                </c:pt>
+                <c:pt idx="294">
+                  <c:v>4</c:v>
+                </c:pt>
+                <c:pt idx="295">
+                  <c:v>4</c:v>
+                </c:pt>
+                <c:pt idx="296">
+                  <c:v>4</c:v>
+                </c:pt>
+                <c:pt idx="297">
+                  <c:v>4</c:v>
+                </c:pt>
+                <c:pt idx="298">
+                  <c:v>3</c:v>
+                </c:pt>
+                <c:pt idx="299">
+                  <c:v>3</c:v>
+                </c:pt>
+                <c:pt idx="300">
+                  <c:v>3</c:v>
+                </c:pt>
+                <c:pt idx="301">
+                  <c:v>3</c:v>
+                </c:pt>
+                <c:pt idx="302">
+                  <c:v>3</c:v>
+                </c:pt>
+                <c:pt idx="303">
+                  <c:v>3</c:v>
+                </c:pt>
+                <c:pt idx="304">
+                  <c:v>3</c:v>
+                </c:pt>
+                <c:pt idx="305">
+                  <c:v>3</c:v>
+                </c:pt>
+                <c:pt idx="306">
+                  <c:v>3</c:v>
+                </c:pt>
+                <c:pt idx="307">
+                  <c:v>3</c:v>
+                </c:pt>
+                <c:pt idx="308">
+                  <c:v>2</c:v>
+                </c:pt>
+                <c:pt idx="309">
+                  <c:v>2</c:v>
+                </c:pt>
+                <c:pt idx="310">
+                  <c:v>2</c:v>
+                </c:pt>
+                <c:pt idx="311">
+                  <c:v>2</c:v>
+                </c:pt>
+                <c:pt idx="312">
+                  <c:v>2</c:v>
+                </c:pt>
+                <c:pt idx="313">
+                  <c:v>2</c:v>
+                </c:pt>
+                <c:pt idx="314">
+                  <c:v>2</c:v>
+                </c:pt>
+                <c:pt idx="315">
+                  <c:v>2</c:v>
+                </c:pt>
+                <c:pt idx="316">
+                  <c:v>2</c:v>
+                </c:pt>
+                <c:pt idx="317">
+                  <c:v>2</c:v>
+                </c:pt>
+                <c:pt idx="318">
+                  <c:v>2</c:v>
+                </c:pt>
+                <c:pt idx="319">
+                  <c:v>2</c:v>
+                </c:pt>
+                <c:pt idx="320">
+                  <c:v>2</c:v>
+                </c:pt>
+                <c:pt idx="321">
+                  <c:v>2</c:v>
+                </c:pt>
+                <c:pt idx="322">
+                  <c:v>2</c:v>
+                </c:pt>
+                <c:pt idx="323">
+                  <c:v>2</c:v>
+                </c:pt>
+                <c:pt idx="324">
+                  <c:v>2</c:v>
+                </c:pt>
+                <c:pt idx="325">
+                  <c:v>2</c:v>
+                </c:pt>
+                <c:pt idx="326">
+                  <c:v>2</c:v>
+                </c:pt>
+                <c:pt idx="327">
+                  <c:v>2</c:v>
+                </c:pt>
+                <c:pt idx="328">
+                  <c:v>2</c:v>
+                </c:pt>
+                <c:pt idx="329">
+                  <c:v>2</c:v>
+                </c:pt>
+                <c:pt idx="330">
+                  <c:v>2</c:v>
+                </c:pt>
+                <c:pt idx="331">
+                  <c:v>2</c:v>
+                </c:pt>
+                <c:pt idx="332">
+                  <c:v>2</c:v>
+                </c:pt>
+                <c:pt idx="333">
+                  <c:v>1</c:v>
+                </c:pt>
+                <c:pt idx="334">
+                  <c:v>1</c:v>
+                </c:pt>
+                <c:pt idx="335">
+                  <c:v>1</c:v>
+                </c:pt>
+                <c:pt idx="336">
+                  <c:v>1</c:v>
+                </c:pt>
+                <c:pt idx="337">
+                  <c:v>1</c:v>
+                </c:pt>
+                <c:pt idx="338">
+                  <c:v>1</c:v>
+                </c:pt>
+                <c:pt idx="339">
+                  <c:v>1</c:v>
+                </c:pt>
+                <c:pt idx="340">
+                  <c:v>1</c:v>
+                </c:pt>
+                <c:pt idx="341">
+                  <c:v>1</c:v>
+                </c:pt>
+                <c:pt idx="342">
+                  <c:v>1</c:v>
+                </c:pt>
+                <c:pt idx="343">
+                  <c:v>1</c:v>
+                </c:pt>
+                <c:pt idx="344">
+                  <c:v>1</c:v>
+                </c:pt>
+                <c:pt idx="345">
+                  <c:v>1</c:v>
+                </c:pt>
+                <c:pt idx="346">
+                  <c:v>1</c:v>
+                </c:pt>
+                <c:pt idx="347">
+                  <c:v>1</c:v>
+                </c:pt>
+                <c:pt idx="348">
+                  <c:v>1</c:v>
+                </c:pt>
+                <c:pt idx="349">
+                  <c:v>1</c:v>
+                </c:pt>
+                <c:pt idx="350">
+                  <c:v>1</c:v>
+                </c:pt>
+              </c:numCache>
+            </c:numRef>
+          </c:yVal>
+          <c:smooth val="0"/>
+          <c:extLst>
+            <c:ext xmlns:c16="http://schemas.microsoft.com/office/drawing/2014/chart" uri="{C3380CC4-5D6E-409C-BE32-E72D297353CC}">
+              <c16:uniqueId val="{00000000-956D-1C4C-9D10-5DB41247A49D}"/>
+            </c:ext>
+          </c:extLst>
+        </c:ser>
+        <c:dLbls>
+          <c:showLegendKey val="0"/>
+          <c:showVal val="0"/>
+          <c:showCatName val="0"/>
+          <c:showSerName val="0"/>
+          <c:showPercent val="0"/>
+          <c:showBubbleSize val="0"/>
+        </c:dLbls>
+        <c:axId val="592255888"/>
+        <c:axId val="582904224"/>
+      </c:scatterChart>
+      <c:valAx>
+        <c:axId val="592255888"/>
+        <c:scaling>
+          <c:orientation val="minMax"/>
+        </c:scaling>
+        <c:delete val="0"/>
+        <c:axPos val="b"/>
+        <c:majorGridlines>
+          <c:spPr>
+            <a:ln w="9525" cap="flat" cmpd="sng" algn="ctr">
+              <a:solidFill>
+                <a:schemeClr val="tx1">
+                  <a:lumMod val="15000"/>
+                  <a:lumOff val="85000"/>
+                </a:schemeClr>
+              </a:solidFill>
+              <a:round/>
+            </a:ln>
+            <a:effectLst/>
+          </c:spPr>
+        </c:majorGridlines>
+        <c:title>
+          <c:tx>
+            <c:rich>
+              <a:bodyPr rot="0" spcFirstLastPara="1" vertOverflow="ellipsis" vert="horz" wrap="square" anchor="ctr" anchorCtr="1"/>
+              <a:lstStyle/>
+              <a:p>
+                <a:pPr>
+                  <a:defRPr sz="1200" b="1" i="0" u="none" strike="noStrike" kern="1200" baseline="0">
+                    <a:solidFill>
+                      <a:schemeClr val="tx1">
+                        <a:lumMod val="65000"/>
+                        <a:lumOff val="35000"/>
+                      </a:schemeClr>
+                    </a:solidFill>
+                    <a:latin typeface="Century Gothic" panose="020B0502020202020204" pitchFamily="34" charset="0"/>
+                    <a:ea typeface="+mn-ea"/>
+                    <a:cs typeface="+mn-cs"/>
+                  </a:defRPr>
+                </a:pPr>
+                <a:r>
+                  <a:rPr lang="en-GB" sz="1200" b="1">
+                    <a:latin typeface="Century Gothic" panose="020B0502020202020204" pitchFamily="34" charset="0"/>
+                  </a:rPr>
+                  <a:t>Total web events per customer</a:t>
+                </a:r>
+              </a:p>
+            </c:rich>
+          </c:tx>
+          <c:overlay val="0"/>
+          <c:spPr>
+            <a:noFill/>
+            <a:ln>
+              <a:noFill/>
+            </a:ln>
+            <a:effectLst/>
+          </c:spPr>
+          <c:txPr>
+            <a:bodyPr rot="0" spcFirstLastPara="1" vertOverflow="ellipsis" vert="horz" wrap="square" anchor="ctr" anchorCtr="1"/>
+            <a:lstStyle/>
+            <a:p>
+              <a:pPr>
+                <a:defRPr sz="1200" b="1" i="0" u="none" strike="noStrike" kern="1200" baseline="0">
+                  <a:solidFill>
+                    <a:schemeClr val="tx1">
+                      <a:lumMod val="65000"/>
+                      <a:lumOff val="35000"/>
+                    </a:schemeClr>
+                  </a:solidFill>
+                  <a:latin typeface="Century Gothic" panose="020B0502020202020204" pitchFamily="34" charset="0"/>
+                  <a:ea typeface="+mn-ea"/>
+                  <a:cs typeface="+mn-cs"/>
+                </a:defRPr>
+              </a:pPr>
+              <a:endParaRPr lang="en-NG"/>
+            </a:p>
+          </c:txPr>
+        </c:title>
+        <c:numFmt formatCode="General" sourceLinked="1"/>
+        <c:majorTickMark val="none"/>
+        <c:minorTickMark val="none"/>
+        <c:tickLblPos val="nextTo"/>
+        <c:spPr>
+          <a:noFill/>
+          <a:ln w="9525" cap="flat" cmpd="sng" algn="ctr">
+            <a:solidFill>
+              <a:schemeClr val="tx1">
+                <a:lumMod val="25000"/>
+                <a:lumOff val="75000"/>
+              </a:schemeClr>
+            </a:solidFill>
+            <a:round/>
+          </a:ln>
+          <a:effectLst/>
+        </c:spPr>
+        <c:txPr>
+          <a:bodyPr rot="-60000000" spcFirstLastPara="1" vertOverflow="ellipsis" vert="horz" wrap="square" anchor="ctr" anchorCtr="1"/>
+          <a:lstStyle/>
+          <a:p>
+            <a:pPr>
+              <a:defRPr sz="1197" b="0" i="0" u="none" strike="noStrike" kern="1200" baseline="0">
+                <a:solidFill>
+                  <a:schemeClr val="tx1">
+                    <a:lumMod val="65000"/>
+                    <a:lumOff val="35000"/>
+                  </a:schemeClr>
+                </a:solidFill>
+                <a:latin typeface="+mn-lt"/>
+                <a:ea typeface="+mn-ea"/>
+                <a:cs typeface="+mn-cs"/>
+              </a:defRPr>
+            </a:pPr>
+            <a:endParaRPr lang="en-NG"/>
+          </a:p>
+        </c:txPr>
+        <c:crossAx val="582904224"/>
+        <c:crosses val="autoZero"/>
+        <c:crossBetween val="midCat"/>
+      </c:valAx>
+      <c:valAx>
+        <c:axId val="582904224"/>
+        <c:scaling>
+          <c:orientation val="minMax"/>
+        </c:scaling>
+        <c:delete val="0"/>
+        <c:axPos val="l"/>
+        <c:majorGridlines>
+          <c:spPr>
+            <a:ln w="9525" cap="flat" cmpd="sng" algn="ctr">
+              <a:solidFill>
+                <a:schemeClr val="tx1">
+                  <a:lumMod val="15000"/>
+                  <a:lumOff val="85000"/>
+                </a:schemeClr>
+              </a:solidFill>
+              <a:round/>
+            </a:ln>
+            <a:effectLst/>
+          </c:spPr>
+        </c:majorGridlines>
+        <c:title>
+          <c:tx>
+            <c:rich>
+              <a:bodyPr rot="-5400000" spcFirstLastPara="1" vertOverflow="ellipsis" vert="horz" wrap="square" anchor="ctr" anchorCtr="1"/>
+              <a:lstStyle/>
+              <a:p>
+                <a:pPr>
+                  <a:defRPr sz="1100" b="1" i="0" u="none" strike="noStrike" kern="1200" baseline="0">
+                    <a:solidFill>
+                      <a:schemeClr val="tx1">
+                        <a:lumMod val="65000"/>
+                        <a:lumOff val="35000"/>
+                      </a:schemeClr>
+                    </a:solidFill>
+                    <a:latin typeface="Century Gothic" panose="020B0502020202020204" pitchFamily="34" charset="0"/>
+                    <a:ea typeface="+mn-ea"/>
+                    <a:cs typeface="+mn-cs"/>
+                  </a:defRPr>
+                </a:pPr>
+                <a:r>
+                  <a:rPr lang="en-GB" sz="1100" b="1">
+                    <a:latin typeface="Century Gothic" panose="020B0502020202020204" pitchFamily="34" charset="0"/>
+                  </a:rPr>
+                  <a:t>Total Orders completed</a:t>
+                </a:r>
+              </a:p>
+            </c:rich>
+          </c:tx>
+          <c:overlay val="0"/>
+          <c:spPr>
+            <a:noFill/>
+            <a:ln>
+              <a:noFill/>
+            </a:ln>
+            <a:effectLst/>
+          </c:spPr>
+          <c:txPr>
+            <a:bodyPr rot="-5400000" spcFirstLastPara="1" vertOverflow="ellipsis" vert="horz" wrap="square" anchor="ctr" anchorCtr="1"/>
+            <a:lstStyle/>
+            <a:p>
+              <a:pPr>
+                <a:defRPr sz="1100" b="1" i="0" u="none" strike="noStrike" kern="1200" baseline="0">
+                  <a:solidFill>
+                    <a:schemeClr val="tx1">
+                      <a:lumMod val="65000"/>
+                      <a:lumOff val="35000"/>
+                    </a:schemeClr>
+                  </a:solidFill>
+                  <a:latin typeface="Century Gothic" panose="020B0502020202020204" pitchFamily="34" charset="0"/>
+                  <a:ea typeface="+mn-ea"/>
+                  <a:cs typeface="+mn-cs"/>
+                </a:defRPr>
+              </a:pPr>
+              <a:endParaRPr lang="en-NG"/>
+            </a:p>
+          </c:txPr>
+        </c:title>
+        <c:numFmt formatCode="General" sourceLinked="1"/>
+        <c:majorTickMark val="none"/>
+        <c:minorTickMark val="none"/>
+        <c:tickLblPos val="nextTo"/>
+        <c:spPr>
+          <a:noFill/>
+          <a:ln w="9525" cap="flat" cmpd="sng" algn="ctr">
+            <a:solidFill>
+              <a:schemeClr val="tx1">
+                <a:lumMod val="25000"/>
+                <a:lumOff val="75000"/>
+              </a:schemeClr>
+            </a:solidFill>
+            <a:round/>
+          </a:ln>
+          <a:effectLst/>
+        </c:spPr>
+        <c:txPr>
+          <a:bodyPr rot="-60000000" spcFirstLastPara="1" vertOverflow="ellipsis" vert="horz" wrap="square" anchor="ctr" anchorCtr="1"/>
+          <a:lstStyle/>
+          <a:p>
+            <a:pPr>
+              <a:defRPr sz="1197" b="0" i="0" u="none" strike="noStrike" kern="1200" baseline="0">
+                <a:solidFill>
+                  <a:schemeClr val="tx1">
+                    <a:lumMod val="65000"/>
+                    <a:lumOff val="35000"/>
+                  </a:schemeClr>
+                </a:solidFill>
+                <a:latin typeface="+mn-lt"/>
+                <a:ea typeface="+mn-ea"/>
+                <a:cs typeface="+mn-cs"/>
+              </a:defRPr>
+            </a:pPr>
+            <a:endParaRPr lang="en-NG"/>
+          </a:p>
+        </c:txPr>
+        <c:crossAx val="592255888"/>
+        <c:crosses val="autoZero"/>
+        <c:crossBetween val="midCat"/>
+      </c:valAx>
+      <c:spPr>
+        <a:noFill/>
+        <a:ln>
+          <a:noFill/>
+        </a:ln>
+        <a:effectLst/>
+      </c:spPr>
+    </c:plotArea>
+    <c:plotVisOnly val="1"/>
+    <c:dispBlanksAs val="gap"/>
+    <c:extLst>
+      <c:ext xmlns:c16r3="http://schemas.microsoft.com/office/drawing/2017/03/chart" uri="{56B9EC1D-385E-4148-901F-78D8002777C0}">
+        <c16r3:dataDisplayOptions16>
+          <c16r3:dispNaAsBlank val="1"/>
+        </c16r3:dataDisplayOptions16>
+      </c:ext>
+    </c:extLst>
+    <c:showDLblsOverMax val="0"/>
+  </c:chart>
+  <c:spPr>
+    <a:noFill/>
+    <a:ln>
+      <a:noFill/>
+    </a:ln>
+    <a:effectLst/>
+  </c:spPr>
+  <c:txPr>
+    <a:bodyPr/>
+    <a:lstStyle/>
+    <a:p>
+      <a:pPr>
+        <a:defRPr/>
+      </a:pPr>
+      <a:endParaRPr lang="en-NG"/>
+    </a:p>
+  </c:txPr>
+  <c:externalData r:id="rId3">
+    <c:autoUpdate val="0"/>
+  </c:externalData>
+</c:chartSpace>
+</file>
+
+<file path=ppt/charts/colors1.xml><?xml version="1.0" encoding="utf-8"?>
+<cs:colorStyle xmlns:cs="http://schemas.microsoft.com/office/drawing/2012/chartStyle" xmlns:a="http://schemas.openxmlformats.org/drawingml/2006/main" meth="cycle" id="10">
+  <a:schemeClr val="accent1"/>
+  <a:schemeClr val="accent2"/>
+  <a:schemeClr val="accent3"/>
+  <a:schemeClr val="accent4"/>
+  <a:schemeClr val="accent5"/>
+  <a:schemeClr val="accent6"/>
+  <cs:variation/>
+  <cs:variation>
+    <a:lumMod val="60000"/>
+  </cs:variation>
+  <cs:variation>
+    <a:lumMod val="80000"/>
+    <a:lumOff val="20000"/>
+  </cs:variation>
+  <cs:variation>
+    <a:lumMod val="80000"/>
+  </cs:variation>
+  <cs:variation>
+    <a:lumMod val="60000"/>
+    <a:lumOff val="40000"/>
+  </cs:variation>
+  <cs:variation>
+    <a:lumMod val="50000"/>
+  </cs:variation>
+  <cs:variation>
+    <a:lumMod val="70000"/>
+    <a:lumOff val="30000"/>
+  </cs:variation>
+  <cs:variation>
+    <a:lumMod val="70000"/>
+  </cs:variation>
+  <cs:variation>
+    <a:lumMod val="50000"/>
+    <a:lumOff val="50000"/>
+  </cs:variation>
+</cs:colorStyle>
+</file>
+
+<file path=ppt/charts/colors2.xml><?xml version="1.0" encoding="utf-8"?>
+<cs:colorStyle xmlns:cs="http://schemas.microsoft.com/office/drawing/2012/chartStyle" xmlns:a="http://schemas.openxmlformats.org/drawingml/2006/main" meth="cycle" id="10">
+  <a:schemeClr val="accent1"/>
+  <a:schemeClr val="accent2"/>
+  <a:schemeClr val="accent3"/>
+  <a:schemeClr val="accent4"/>
+  <a:schemeClr val="accent5"/>
+  <a:schemeClr val="accent6"/>
+  <cs:variation/>
+  <cs:variation>
+    <a:lumMod val="60000"/>
+  </cs:variation>
+  <cs:variation>
+    <a:lumMod val="80000"/>
+    <a:lumOff val="20000"/>
+  </cs:variation>
+  <cs:variation>
+    <a:lumMod val="80000"/>
+  </cs:variation>
+  <cs:variation>
+    <a:lumMod val="60000"/>
+    <a:lumOff val="40000"/>
+  </cs:variation>
+  <cs:variation>
+    <a:lumMod val="50000"/>
+  </cs:variation>
+  <cs:variation>
+    <a:lumMod val="70000"/>
+    <a:lumOff val="30000"/>
+  </cs:variation>
+  <cs:variation>
+    <a:lumMod val="70000"/>
+  </cs:variation>
+  <cs:variation>
+    <a:lumMod val="50000"/>
+    <a:lumOff val="50000"/>
+  </cs:variation>
+</cs:colorStyle>
+</file>
+
+<file path=ppt/charts/style1.xml><?xml version="1.0" encoding="utf-8"?>
+<cs:chartStyle xmlns:cs="http://schemas.microsoft.com/office/drawing/2012/chartStyle" xmlns:a="http://schemas.openxmlformats.org/drawingml/2006/main" id="207">
+  <cs:axisTitle>
+    <cs:lnRef idx="0"/>
+    <cs:fillRef idx="0"/>
+    <cs:effectRef idx="0"/>
+    <cs:fontRef idx="minor">
+      <a:schemeClr val="tx2"/>
+    </cs:fontRef>
+    <cs:defRPr sz="900" b="1" kern="1200"/>
+  </cs:axisTitle>
+  <cs:categoryAxis>
+    <cs:lnRef idx="0"/>
+    <cs:fillRef idx="0"/>
+    <cs:effectRef idx="0"/>
+    <cs:fontRef idx="minor">
+      <a:schemeClr val="tx2"/>
+    </cs:fontRef>
+    <cs:spPr>
+      <a:ln w="9525" cap="flat" cmpd="sng" algn="ctr">
+        <a:solidFill>
+          <a:schemeClr val="tx2">
+            <a:lumMod val="15000"/>
+            <a:lumOff val="85000"/>
+          </a:schemeClr>
+        </a:solidFill>
+        <a:round/>
+      </a:ln>
+    </cs:spPr>
+    <cs:defRPr sz="900" kern="1200"/>
+  </cs:categoryAxis>
+  <cs:chartArea mods="allowNoFillOverride allowNoLineOverride">
+    <cs:lnRef idx="0"/>
+    <cs:fillRef idx="0"/>
+    <cs:effectRef idx="0"/>
+    <cs:fontRef idx="minor">
+      <a:schemeClr val="tx2"/>
+    </cs:fontRef>
+    <cs:spPr>
+      <a:solidFill>
+        <a:schemeClr val="bg1"/>
+      </a:solidFill>
+      <a:ln w="9525" cap="flat" cmpd="sng" algn="ctr">
+        <a:solidFill>
+          <a:schemeClr val="tx2">
+            <a:lumMod val="15000"/>
+            <a:lumOff val="85000"/>
+          </a:schemeClr>
+        </a:solidFill>
+        <a:round/>
+      </a:ln>
+    </cs:spPr>
+    <cs:defRPr sz="900" kern="1200"/>
+  </cs:chartArea>
+  <cs:dataLabel>
+    <cs:lnRef idx="0"/>
+    <cs:fillRef idx="0"/>
+    <cs:effectRef idx="0"/>
+    <cs:fontRef idx="minor">
+      <a:schemeClr val="tx2"/>
+    </cs:fontRef>
+    <cs:defRPr sz="900" kern="1200"/>
+  </cs:dataLabel>
+  <cs:dataLabelCallout>
+    <cs:lnRef idx="0"/>
+    <cs:fillRef idx="0"/>
+    <cs:effectRef idx="0"/>
+    <cs:fontRef idx="minor">
+      <a:schemeClr val="dk2">
+        <a:lumMod val="75000"/>
+      </a:schemeClr>
+    </cs:fontRef>
+    <cs:spPr>
+      <a:solidFill>
+        <a:schemeClr val="lt1"/>
+      </a:solidFill>
+      <a:ln>
+        <a:solidFill>
+          <a:schemeClr val="dk1">
+            <a:lumMod val="25000"/>
+            <a:lumOff val="75000"/>
+          </a:schemeClr>
+        </a:solidFill>
+      </a:ln>
+    </cs:spPr>
+    <cs:defRPr sz="900" kern="1200"/>
+    <cs:bodyPr rot="0" spcFirstLastPara="1" vertOverflow="clip" horzOverflow="clip" vert="horz" wrap="square" lIns="36576" tIns="18288" rIns="36576" bIns="18288" anchor="ctr" anchorCtr="1">
+      <a:spAutoFit/>
+    </cs:bodyPr>
+  </cs:dataLabelCallout>
+  <cs:dataPoint>
+    <cs:lnRef idx="0"/>
+    <cs:fillRef idx="3">
+      <cs:styleClr val="auto"/>
+    </cs:fillRef>
+    <cs:effectRef idx="2"/>
+    <cs:fontRef idx="minor">
+      <a:schemeClr val="tx2"/>
+    </cs:fontRef>
+  </cs:dataPoint>
+  <cs:dataPoint3D>
+    <cs:lnRef idx="0"/>
+    <cs:fillRef idx="3">
+      <cs:styleClr val="auto"/>
+    </cs:fillRef>
+    <cs:effectRef idx="2"/>
+    <cs:fontRef idx="minor">
+      <a:schemeClr val="tx2"/>
+    </cs:fontRef>
+  </cs:dataPoint3D>
+  <cs:dataPointLine>
+    <cs:lnRef idx="0">
+      <cs:styleClr val="auto"/>
+    </cs:lnRef>
+    <cs:fillRef idx="3"/>
+    <cs:effectRef idx="2"/>
+    <cs:fontRef idx="minor">
+      <a:schemeClr val="tx2"/>
+    </cs:fontRef>
+    <cs:spPr>
+      <a:ln w="31750" cap="rnd">
+        <a:solidFill>
+          <a:schemeClr val="phClr"/>
+        </a:solidFill>
+        <a:round/>
+      </a:ln>
+    </cs:spPr>
+  </cs:dataPointLine>
+  <cs:dataPointMarker>
+    <cs:lnRef idx="0"/>
+    <cs:fillRef idx="3">
+      <cs:styleClr val="auto"/>
+    </cs:fillRef>
+    <cs:effectRef idx="2"/>
+    <cs:fontRef idx="minor">
+      <a:schemeClr val="tx2"/>
+    </cs:fontRef>
+    <cs:spPr>
+      <a:ln w="12700">
+        <a:solidFill>
+          <a:schemeClr val="lt2"/>
+        </a:solidFill>
+        <a:round/>
+      </a:ln>
+    </cs:spPr>
+  </cs:dataPointMarker>
+  <cs:dataPointMarkerLayout symbol="circle" size="6"/>
+  <cs:dataPointWireframe>
+    <cs:lnRef idx="0">
+      <cs:styleClr val="auto"/>
+    </cs:lnRef>
+    <cs:fillRef idx="3"/>
+    <cs:effectRef idx="2"/>
+    <cs:fontRef idx="minor">
+      <a:schemeClr val="tx2"/>
+    </cs:fontRef>
+    <cs:spPr>
+      <a:ln w="9525" cap="rnd">
+        <a:solidFill>
+          <a:schemeClr val="phClr"/>
+        </a:solidFill>
+        <a:round/>
+      </a:ln>
+    </cs:spPr>
+  </cs:dataPointWireframe>
+  <cs:dataTable>
+    <cs:lnRef idx="0"/>
+    <cs:fillRef idx="0"/>
+    <cs:effectRef idx="0"/>
+    <cs:fontRef idx="minor">
+      <a:schemeClr val="tx2"/>
+    </cs:fontRef>
+    <cs:spPr>
+      <a:ln w="9525">
+        <a:solidFill>
+          <a:schemeClr val="tx2">
+            <a:lumMod val="15000"/>
+            <a:lumOff val="85000"/>
+          </a:schemeClr>
+        </a:solidFill>
+      </a:ln>
+    </cs:spPr>
+    <cs:defRPr sz="900" kern="1200"/>
+  </cs:dataTable>
+  <cs:downBar>
+    <cs:lnRef idx="0"/>
+    <cs:fillRef idx="0"/>
+    <cs:effectRef idx="0"/>
+    <cs:fontRef idx="minor">
+      <a:schemeClr val="dk1"/>
+    </cs:fontRef>
+    <cs:spPr>
+      <a:solidFill>
+        <a:schemeClr val="dk1">
+          <a:lumMod val="65000"/>
+          <a:lumOff val="35000"/>
+        </a:schemeClr>
+      </a:solidFill>
+      <a:ln w="9525">
+        <a:solidFill>
+          <a:schemeClr val="tx1">
+            <a:lumMod val="65000"/>
+            <a:lumOff val="35000"/>
+          </a:schemeClr>
+        </a:solidFill>
+      </a:ln>
+    </cs:spPr>
+  </cs:downBar>
+  <cs:dropLine>
+    <cs:lnRef idx="0"/>
+    <cs:fillRef idx="0"/>
+    <cs:effectRef idx="0"/>
+    <cs:fontRef idx="minor">
+      <a:schemeClr val="tx2"/>
+    </cs:fontRef>
+    <cs:spPr>
+      <a:ln w="9525">
+        <a:solidFill>
+          <a:schemeClr val="tx2">
+            <a:lumMod val="60000"/>
+            <a:lumOff val="40000"/>
+          </a:schemeClr>
+        </a:solidFill>
+        <a:prstDash val="dash"/>
+      </a:ln>
+    </cs:spPr>
+  </cs:dropLine>
+  <cs:errorBar>
+    <cs:lnRef idx="0"/>
+    <cs:fillRef idx="0"/>
+    <cs:effectRef idx="0"/>
+    <cs:fontRef idx="minor">
+      <a:schemeClr val="tx2"/>
+    </cs:fontRef>
+    <cs:spPr>
+      <a:ln w="9525">
+        <a:solidFill>
+          <a:schemeClr val="tx2">
+            <a:lumMod val="75000"/>
+            <a:lumOff val="25000"/>
+          </a:schemeClr>
+        </a:solidFill>
+        <a:round/>
+      </a:ln>
+    </cs:spPr>
+  </cs:errorBar>
+  <cs:floor>
+    <cs:lnRef idx="0"/>
+    <cs:fillRef idx="0"/>
+    <cs:effectRef idx="0"/>
+    <cs:fontRef idx="minor">
+      <a:schemeClr val="tx2"/>
+    </cs:fontRef>
+  </cs:floor>
+  <cs:gridlineMajor>
+    <cs:lnRef idx="0"/>
+    <cs:fillRef idx="0"/>
+    <cs:effectRef idx="0"/>
+    <cs:fontRef idx="minor">
+      <a:schemeClr val="tx2"/>
+    </cs:fontRef>
+    <cs:spPr>
+      <a:ln w="9525" cap="flat" cmpd="sng" algn="ctr">
+        <a:solidFill>
+          <a:schemeClr val="tx2">
+            <a:lumMod val="15000"/>
+            <a:lumOff val="85000"/>
+          </a:schemeClr>
+        </a:solidFill>
+        <a:round/>
+      </a:ln>
+    </cs:spPr>
+  </cs:gridlineMajor>
+  <cs:gridlineMinor>
+    <cs:lnRef idx="0"/>
+    <cs:fillRef idx="0"/>
+    <cs:effectRef idx="0"/>
+    <cs:fontRef idx="minor">
+      <a:schemeClr val="tx2"/>
+    </cs:fontRef>
+    <cs:spPr>
+      <a:ln>
+        <a:solidFill>
+          <a:schemeClr val="tx2">
+            <a:lumMod val="5000"/>
+            <a:lumOff val="95000"/>
+          </a:schemeClr>
+        </a:solidFill>
+      </a:ln>
+    </cs:spPr>
+  </cs:gridlineMinor>
+  <cs:hiLoLine>
+    <cs:lnRef idx="0"/>
+    <cs:fillRef idx="0"/>
+    <cs:effectRef idx="0"/>
+    <cs:fontRef idx="minor">
+      <a:schemeClr val="tx2"/>
+    </cs:fontRef>
+    <cs:spPr>
+      <a:ln w="9525">
+        <a:solidFill>
+          <a:schemeClr val="tx2">
+            <a:lumMod val="60000"/>
+            <a:lumOff val="40000"/>
+          </a:schemeClr>
+        </a:solidFill>
+        <a:prstDash val="dash"/>
+      </a:ln>
+    </cs:spPr>
+  </cs:hiLoLine>
+  <cs:leaderLine>
+    <cs:lnRef idx="0"/>
+    <cs:fillRef idx="0"/>
+    <cs:effectRef idx="0"/>
+    <cs:fontRef idx="minor">
+      <a:schemeClr val="tx2"/>
+    </cs:fontRef>
+    <cs:spPr>
+      <a:ln w="9525">
+        <a:solidFill>
+          <a:schemeClr val="tx2">
+            <a:lumMod val="35000"/>
+            <a:lumOff val="65000"/>
+          </a:schemeClr>
+        </a:solidFill>
+      </a:ln>
+    </cs:spPr>
+  </cs:leaderLine>
+  <cs:legend>
+    <cs:lnRef idx="0"/>
+    <cs:fillRef idx="0"/>
+    <cs:effectRef idx="0"/>
+    <cs:fontRef idx="minor">
+      <a:schemeClr val="tx2"/>
+    </cs:fontRef>
+    <cs:defRPr sz="900" kern="1200"/>
+  </cs:legend>
+  <cs:plotArea>
+    <cs:lnRef idx="0"/>
+    <cs:fillRef idx="0"/>
+    <cs:effectRef idx="0"/>
+    <cs:fontRef idx="minor">
+      <a:schemeClr val="tx2"/>
+    </cs:fontRef>
+  </cs:plotArea>
+  <cs:plotArea3D>
+    <cs:lnRef idx="0"/>
+    <cs:fillRef idx="0"/>
+    <cs:effectRef idx="0"/>
+    <cs:fontRef idx="minor">
+      <a:schemeClr val="tx2"/>
+    </cs:fontRef>
+  </cs:plotArea3D>
+  <cs:seriesAxis>
+    <cs:lnRef idx="0"/>
+    <cs:fillRef idx="0"/>
+    <cs:effectRef idx="0"/>
+    <cs:fontRef idx="minor">
+      <a:schemeClr val="tx2"/>
+    </cs:fontRef>
+    <cs:spPr>
+      <a:ln w="9525" cap="flat" cmpd="sng" algn="ctr">
+        <a:solidFill>
+          <a:schemeClr val="tx2">
+            <a:lumMod val="15000"/>
+            <a:lumOff val="85000"/>
+          </a:schemeClr>
+        </a:solidFill>
+        <a:round/>
+      </a:ln>
+    </cs:spPr>
+    <cs:defRPr sz="900" kern="1200"/>
+  </cs:seriesAxis>
+  <cs:seriesLine>
+    <cs:lnRef idx="0"/>
+    <cs:fillRef idx="0"/>
+    <cs:effectRef idx="0"/>
+    <cs:fontRef idx="minor">
+      <a:schemeClr val="tx2"/>
+    </cs:fontRef>
+    <cs:spPr>
+      <a:ln w="9525">
+        <a:solidFill>
+          <a:schemeClr val="tx2">
+            <a:lumMod val="60000"/>
+            <a:lumOff val="40000"/>
+          </a:schemeClr>
+        </a:solidFill>
+        <a:prstDash val="dash"/>
+      </a:ln>
+    </cs:spPr>
+  </cs:seriesLine>
+  <cs:title>
+    <cs:lnRef idx="0"/>
+    <cs:fillRef idx="0"/>
+    <cs:effectRef idx="0"/>
+    <cs:fontRef idx="minor">
+      <a:schemeClr val="tx2"/>
+    </cs:fontRef>
+    <cs:defRPr sz="1600" b="1" kern="1200"/>
+  </cs:title>
+  <cs:trendline>
+    <cs:lnRef idx="0">
+      <cs:styleClr val="auto"/>
+    </cs:lnRef>
+    <cs:fillRef idx="0"/>
+    <cs:effectRef idx="0"/>
+    <cs:fontRef idx="minor">
+      <a:schemeClr val="tx2"/>
+    </cs:fontRef>
+    <cs:spPr>
+      <a:ln w="19050" cap="rnd">
+        <a:solidFill>
+          <a:schemeClr val="phClr"/>
+        </a:solidFill>
+        <a:prstDash val="sysDash"/>
+      </a:ln>
+    </cs:spPr>
+  </cs:trendline>
+  <cs:trendlineLabel>
+    <cs:lnRef idx="0"/>
+    <cs:fillRef idx="0"/>
+    <cs:effectRef idx="0"/>
+    <cs:fontRef idx="minor">
+      <a:schemeClr val="tx2"/>
+    </cs:fontRef>
+    <cs:defRPr sz="900" kern="1200"/>
+  </cs:trendlineLabel>
+  <cs:upBar>
+    <cs:lnRef idx="0"/>
+    <cs:fillRef idx="0"/>
+    <cs:effectRef idx="0"/>
+    <cs:fontRef idx="minor">
+      <a:schemeClr val="tx2"/>
+    </cs:fontRef>
+    <cs:spPr>
+      <a:solidFill>
+        <a:schemeClr val="lt1"/>
+      </a:solidFill>
+      <a:ln w="9525">
+        <a:solidFill>
+          <a:schemeClr val="tx1">
+            <a:lumMod val="15000"/>
+            <a:lumOff val="85000"/>
+          </a:schemeClr>
+        </a:solidFill>
+      </a:ln>
+    </cs:spPr>
+  </cs:upBar>
+  <cs:valueAxis>
+    <cs:lnRef idx="0"/>
+    <cs:fillRef idx="0"/>
+    <cs:effectRef idx="0"/>
+    <cs:fontRef idx="minor">
+      <a:schemeClr val="tx2"/>
+    </cs:fontRef>
+    <cs:defRPr sz="900" kern="1200"/>
+  </cs:valueAxis>
+  <cs:wall>
+    <cs:lnRef idx="0"/>
+    <cs:fillRef idx="0"/>
+    <cs:effectRef idx="0"/>
+    <cs:fontRef idx="minor">
+      <a:schemeClr val="tx2"/>
+    </cs:fontRef>
+  </cs:wall>
+</cs:chartStyle>
+</file>
+
+<file path=ppt/charts/style2.xml><?xml version="1.0" encoding="utf-8"?>
+<cs:chartStyle xmlns:cs="http://schemas.microsoft.com/office/drawing/2012/chartStyle" xmlns:a="http://schemas.openxmlformats.org/drawingml/2006/main" id="240">
+  <cs:axisTitle>
+    <cs:lnRef idx="0"/>
+    <cs:fillRef idx="0"/>
+    <cs:effectRef idx="0"/>
+    <cs:fontRef idx="minor">
+      <a:schemeClr val="tx1">
+        <a:lumMod val="65000"/>
+        <a:lumOff val="35000"/>
+      </a:schemeClr>
+    </cs:fontRef>
+    <cs:defRPr sz="1330" kern="1200"/>
+  </cs:axisTitle>
+  <cs:categoryAxis>
+    <cs:lnRef idx="0"/>
+    <cs:fillRef idx="0"/>
+    <cs:effectRef idx="0"/>
+    <cs:fontRef idx="minor">
+      <a:schemeClr val="tx1">
+        <a:lumMod val="65000"/>
+        <a:lumOff val="35000"/>
+      </a:schemeClr>
+    </cs:fontRef>
+    <cs:spPr>
+      <a:ln w="9525" cap="flat" cmpd="sng" algn="ctr">
+        <a:solidFill>
+          <a:schemeClr val="tx1">
+            <a:lumMod val="25000"/>
+            <a:lumOff val="75000"/>
+          </a:schemeClr>
+        </a:solidFill>
+        <a:round/>
+      </a:ln>
+    </cs:spPr>
+    <cs:defRPr sz="1197" kern="1200"/>
+  </cs:categoryAxis>
+  <cs:chartArea mods="allowNoFillOverride allowNoLineOverride">
+    <cs:lnRef idx="0"/>
+    <cs:fillRef idx="0"/>
+    <cs:effectRef idx="0"/>
+    <cs:fontRef idx="minor">
+      <a:schemeClr val="tx1"/>
+    </cs:fontRef>
+    <cs:spPr>
+      <a:solidFill>
+        <a:schemeClr val="bg1"/>
+      </a:solidFill>
+      <a:ln w="9525" cap="flat" cmpd="sng" algn="ctr">
+        <a:solidFill>
+          <a:schemeClr val="tx1">
+            <a:lumMod val="15000"/>
+            <a:lumOff val="85000"/>
+          </a:schemeClr>
+        </a:solidFill>
+        <a:round/>
+      </a:ln>
+    </cs:spPr>
+    <cs:defRPr sz="1330" kern="1200"/>
+  </cs:chartArea>
+  <cs:dataLabel>
+    <cs:lnRef idx="0"/>
+    <cs:fillRef idx="0"/>
+    <cs:effectRef idx="0"/>
+    <cs:fontRef idx="minor">
+      <a:schemeClr val="tx1">
+        <a:lumMod val="75000"/>
+        <a:lumOff val="25000"/>
+      </a:schemeClr>
+    </cs:fontRef>
+    <cs:defRPr sz="1197" kern="1200"/>
+  </cs:dataLabel>
+  <cs:dataLabelCallout>
+    <cs:lnRef idx="0"/>
+    <cs:fillRef idx="0"/>
+    <cs:effectRef idx="0"/>
+    <cs:fontRef idx="minor">
+      <a:schemeClr val="dk1">
+        <a:lumMod val="65000"/>
+        <a:lumOff val="35000"/>
+      </a:schemeClr>
+    </cs:fontRef>
+    <cs:spPr>
+      <a:solidFill>
+        <a:schemeClr val="lt1"/>
+      </a:solidFill>
+      <a:ln>
+        <a:solidFill>
+          <a:schemeClr val="dk1">
+            <a:lumMod val="25000"/>
+            <a:lumOff val="75000"/>
+          </a:schemeClr>
+        </a:solidFill>
+      </a:ln>
+    </cs:spPr>
+    <cs:defRPr sz="1197" kern="1200"/>
+    <cs:bodyPr rot="0" spcFirstLastPara="1" vertOverflow="clip" horzOverflow="clip" vert="horz" wrap="square" lIns="36576" tIns="18288" rIns="36576" bIns="18288" anchor="ctr" anchorCtr="1">
+      <a:spAutoFit/>
+    </cs:bodyPr>
+  </cs:dataLabelCallout>
+  <cs:dataPoint>
+    <cs:lnRef idx="0"/>
+    <cs:fillRef idx="1">
+      <cs:styleClr val="auto"/>
+    </cs:fillRef>
+    <cs:effectRef idx="0"/>
+    <cs:fontRef idx="minor">
+      <a:schemeClr val="tx1"/>
+    </cs:fontRef>
+  </cs:dataPoint>
+  <cs:dataPoint3D>
+    <cs:lnRef idx="0"/>
+    <cs:fillRef idx="1">
+      <cs:styleClr val="auto"/>
+    </cs:fillRef>
+    <cs:effectRef idx="0"/>
+    <cs:fontRef idx="minor">
+      <a:schemeClr val="tx1"/>
+    </cs:fontRef>
+  </cs:dataPoint3D>
+  <cs:dataPointLine>
+    <cs:lnRef idx="0">
+      <cs:styleClr val="auto"/>
+    </cs:lnRef>
+    <cs:fillRef idx="1"/>
+    <cs:effectRef idx="0"/>
+    <cs:fontRef idx="minor">
+      <a:schemeClr val="tx1"/>
+    </cs:fontRef>
+    <cs:spPr>
+      <a:ln w="19050" cap="rnd">
+        <a:solidFill>
+          <a:schemeClr val="phClr"/>
+        </a:solidFill>
+        <a:round/>
+      </a:ln>
+    </cs:spPr>
+  </cs:dataPointLine>
+  <cs:dataPointMarker>
+    <cs:lnRef idx="0">
+      <cs:styleClr val="auto"/>
+    </cs:lnRef>
+    <cs:fillRef idx="1">
+      <cs:styleClr val="auto"/>
+    </cs:fillRef>
+    <cs:effectRef idx="0"/>
+    <cs:fontRef idx="minor">
+      <a:schemeClr val="tx1"/>
+    </cs:fontRef>
+    <cs:spPr>
+      <a:ln w="9525">
+        <a:solidFill>
+          <a:schemeClr val="phClr"/>
+        </a:solidFill>
+      </a:ln>
+    </cs:spPr>
+  </cs:dataPointMarker>
+  <cs:dataPointMarkerLayout symbol="circle" size="5"/>
+  <cs:dataPointWireframe>
+    <cs:lnRef idx="0">
+      <cs:styleClr val="auto"/>
+    </cs:lnRef>
+    <cs:fillRef idx="0"/>
+    <cs:effectRef idx="0"/>
+    <cs:fontRef idx="minor">
+      <a:schemeClr val="dk1"/>
+    </cs:fontRef>
+    <cs:spPr>
+      <a:ln w="9525" cap="rnd">
+        <a:solidFill>
+          <a:schemeClr val="phClr"/>
+        </a:solidFill>
+        <a:round/>
+      </a:ln>
+    </cs:spPr>
+  </cs:dataPointWireframe>
+  <cs:dataTable>
+    <cs:lnRef idx="0"/>
+    <cs:fillRef idx="0"/>
+    <cs:effectRef idx="0"/>
+    <cs:fontRef idx="minor">
+      <a:schemeClr val="tx1">
+        <a:lumMod val="65000"/>
+        <a:lumOff val="35000"/>
+      </a:schemeClr>
+    </cs:fontRef>
+    <cs:spPr>
+      <a:noFill/>
+      <a:ln w="9525" cap="flat" cmpd="sng" algn="ctr">
+        <a:solidFill>
+          <a:schemeClr val="tx1">
+            <a:lumMod val="15000"/>
+            <a:lumOff val="85000"/>
+          </a:schemeClr>
+        </a:solidFill>
+        <a:round/>
+      </a:ln>
+    </cs:spPr>
+    <cs:defRPr sz="1197" kern="1200"/>
+  </cs:dataTable>
+  <cs:downBar>
+    <cs:lnRef idx="0"/>
+    <cs:fillRef idx="0"/>
+    <cs:effectRef idx="0"/>
+    <cs:fontRef idx="minor">
+      <a:schemeClr val="tx1"/>
+    </cs:fontRef>
+    <cs:spPr>
+      <a:solidFill>
+        <a:schemeClr val="dk1">
+          <a:lumMod val="75000"/>
+          <a:lumOff val="25000"/>
+        </a:schemeClr>
+      </a:solidFill>
+      <a:ln w="9525" cap="flat" cmpd="sng" algn="ctr">
+        <a:solidFill>
+          <a:schemeClr val="tx1">
+            <a:lumMod val="65000"/>
+            <a:lumOff val="35000"/>
+          </a:schemeClr>
+        </a:solidFill>
+        <a:round/>
+      </a:ln>
+    </cs:spPr>
+  </cs:downBar>
+  <cs:dropLine>
+    <cs:lnRef idx="0"/>
+    <cs:fillRef idx="0"/>
+    <cs:effectRef idx="0"/>
+    <cs:fontRef idx="minor">
+      <a:schemeClr val="tx1"/>
+    </cs:fontRef>
+    <cs:spPr>
+      <a:ln w="9525" cap="flat" cmpd="sng" algn="ctr">
+        <a:solidFill>
+          <a:schemeClr val="tx1">
+            <a:lumMod val="35000"/>
+            <a:lumOff val="65000"/>
+          </a:schemeClr>
+        </a:solidFill>
+        <a:round/>
+      </a:ln>
+    </cs:spPr>
+  </cs:dropLine>
+  <cs:errorBar>
+    <cs:lnRef idx="0"/>
+    <cs:fillRef idx="0"/>
+    <cs:effectRef idx="0"/>
+    <cs:fontRef idx="minor">
+      <a:schemeClr val="tx1"/>
+    </cs:fontRef>
+    <cs:spPr>
+      <a:ln w="9525" cap="flat" cmpd="sng" algn="ctr">
+        <a:solidFill>
+          <a:schemeClr val="tx1">
+            <a:lumMod val="65000"/>
+            <a:lumOff val="35000"/>
+          </a:schemeClr>
+        </a:solidFill>
+        <a:round/>
+      </a:ln>
+    </cs:spPr>
+  </cs:errorBar>
+  <cs:floor>
+    <cs:lnRef idx="0"/>
+    <cs:fillRef idx="0"/>
+    <cs:effectRef idx="0"/>
+    <cs:fontRef idx="minor">
+      <a:schemeClr val="tx1"/>
+    </cs:fontRef>
+    <cs:spPr>
+      <a:noFill/>
+      <a:ln>
+        <a:noFill/>
+      </a:ln>
+    </cs:spPr>
+  </cs:floor>
+  <cs:gridlineMajor>
+    <cs:lnRef idx="0"/>
+    <cs:fillRef idx="0"/>
+    <cs:effectRef idx="0"/>
+    <cs:fontRef idx="minor">
+      <a:schemeClr val="tx1"/>
+    </cs:fontRef>
+    <cs:spPr>
+      <a:ln w="9525" cap="flat" cmpd="sng" algn="ctr">
+        <a:solidFill>
+          <a:schemeClr val="tx1">
+            <a:lumMod val="15000"/>
+            <a:lumOff val="85000"/>
+          </a:schemeClr>
+        </a:solidFill>
+        <a:round/>
+      </a:ln>
+    </cs:spPr>
+  </cs:gridlineMajor>
+  <cs:gridlineMinor>
+    <cs:lnRef idx="0"/>
+    <cs:fillRef idx="0"/>
+    <cs:effectRef idx="0"/>
+    <cs:fontRef idx="minor">
+      <a:schemeClr val="tx1"/>
+    </cs:fontRef>
+    <cs:spPr>
+      <a:ln w="9525" cap="flat" cmpd="sng" algn="ctr">
+        <a:solidFill>
+          <a:schemeClr val="tx1">
+            <a:lumMod val="5000"/>
+            <a:lumOff val="95000"/>
+          </a:schemeClr>
+        </a:solidFill>
+        <a:round/>
+      </a:ln>
+    </cs:spPr>
+  </cs:gridlineMinor>
+  <cs:hiLoLine>
+    <cs:lnRef idx="0"/>
+    <cs:fillRef idx="0"/>
+    <cs:effectRef idx="0"/>
+    <cs:fontRef idx="minor">
+      <a:schemeClr val="tx1"/>
+    </cs:fontRef>
+    <cs:spPr>
+      <a:ln w="9525" cap="flat" cmpd="sng" algn="ctr">
+        <a:solidFill>
+          <a:schemeClr val="tx1">
+            <a:lumMod val="50000"/>
+            <a:lumOff val="50000"/>
+          </a:schemeClr>
+        </a:solidFill>
+        <a:round/>
+      </a:ln>
+    </cs:spPr>
+  </cs:hiLoLine>
+  <cs:leaderLine>
+    <cs:lnRef idx="0"/>
+    <cs:fillRef idx="0"/>
+    <cs:effectRef idx="0"/>
+    <cs:fontRef idx="minor">
+      <a:schemeClr val="tx1"/>
+    </cs:fontRef>
+    <cs:spPr>
+      <a:ln w="9525" cap="flat" cmpd="sng" algn="ctr">
+        <a:solidFill>
+          <a:schemeClr val="tx1">
+            <a:lumMod val="35000"/>
+            <a:lumOff val="65000"/>
+          </a:schemeClr>
+        </a:solidFill>
+        <a:round/>
+      </a:ln>
+    </cs:spPr>
+  </cs:leaderLine>
+  <cs:legend>
+    <cs:lnRef idx="0"/>
+    <cs:fillRef idx="0"/>
+    <cs:effectRef idx="0"/>
+    <cs:fontRef idx="minor">
+      <a:schemeClr val="tx1">
+        <a:lumMod val="65000"/>
+        <a:lumOff val="35000"/>
+      </a:schemeClr>
+    </cs:fontRef>
+    <cs:defRPr sz="1197" kern="1200"/>
+  </cs:legend>
+  <cs:plotArea mods="allowNoFillOverride allowNoLineOverride">
+    <cs:lnRef idx="0"/>
+    <cs:fillRef idx="0"/>
+    <cs:effectRef idx="0"/>
+    <cs:fontRef idx="minor">
+      <a:schemeClr val="tx1"/>
+    </cs:fontRef>
+  </cs:plotArea>
+  <cs:plotArea3D mods="allowNoFillOverride allowNoLineOverride">
+    <cs:lnRef idx="0"/>
+    <cs:fillRef idx="0"/>
+    <cs:effectRef idx="0"/>
+    <cs:fontRef idx="minor">
+      <a:schemeClr val="tx1"/>
+    </cs:fontRef>
+  </cs:plotArea3D>
+  <cs:seriesAxis>
+    <cs:lnRef idx="0"/>
+    <cs:fillRef idx="0"/>
+    <cs:effectRef idx="0"/>
+    <cs:fontRef idx="minor">
+      <a:schemeClr val="tx1">
+        <a:lumMod val="65000"/>
+        <a:lumOff val="35000"/>
+      </a:schemeClr>
+    </cs:fontRef>
+    <cs:defRPr sz="1197" kern="1200"/>
+  </cs:seriesAxis>
+  <cs:seriesLine>
+    <cs:lnRef idx="0"/>
+    <cs:fillRef idx="0"/>
+    <cs:effectRef idx="0"/>
+    <cs:fontRef idx="minor">
+      <a:schemeClr val="tx1"/>
+    </cs:fontRef>
+    <cs:spPr>
+      <a:ln w="9525" cap="flat" cmpd="sng" algn="ctr">
+        <a:solidFill>
+          <a:schemeClr val="tx1">
+            <a:lumMod val="35000"/>
+            <a:lumOff val="65000"/>
+          </a:schemeClr>
+        </a:solidFill>
+        <a:round/>
+      </a:ln>
+    </cs:spPr>
+  </cs:seriesLine>
+  <cs:title>
+    <cs:lnRef idx="0"/>
+    <cs:fillRef idx="0"/>
+    <cs:effectRef idx="0"/>
+    <cs:fontRef idx="minor">
+      <a:schemeClr val="tx1">
+        <a:lumMod val="65000"/>
+        <a:lumOff val="35000"/>
+      </a:schemeClr>
+    </cs:fontRef>
+    <cs:defRPr sz="1862" b="0" kern="1200" spc="0" baseline="0"/>
+  </cs:title>
+  <cs:trendline>
+    <cs:lnRef idx="0">
+      <cs:styleClr val="auto"/>
+    </cs:lnRef>
+    <cs:fillRef idx="0"/>
+    <cs:effectRef idx="0"/>
+    <cs:fontRef idx="minor">
+      <a:schemeClr val="tx1"/>
+    </cs:fontRef>
+    <cs:spPr>
+      <a:ln w="19050" cap="rnd">
+        <a:solidFill>
+          <a:schemeClr val="phClr"/>
+        </a:solidFill>
+        <a:prstDash val="sysDot"/>
+      </a:ln>
+    </cs:spPr>
+  </cs:trendline>
+  <cs:trendlineLabel>
+    <cs:lnRef idx="0"/>
+    <cs:fillRef idx="0"/>
+    <cs:effectRef idx="0"/>
+    <cs:fontRef idx="minor">
+      <a:schemeClr val="tx1">
+        <a:lumMod val="65000"/>
+        <a:lumOff val="35000"/>
+      </a:schemeClr>
+    </cs:fontRef>
+    <cs:defRPr sz="1197" kern="1200"/>
+  </cs:trendlineLabel>
+  <cs:upBar>
+    <cs:lnRef idx="0"/>
+    <cs:fillRef idx="0"/>
+    <cs:effectRef idx="0"/>
+    <cs:fontRef idx="minor">
+      <a:schemeClr val="tx1"/>
+    </cs:fontRef>
+    <cs:spPr>
+      <a:solidFill>
+        <a:schemeClr val="lt1"/>
+      </a:solidFill>
+      <a:ln w="9525" cap="flat" cmpd="sng" algn="ctr">
+        <a:solidFill>
+          <a:schemeClr val="tx1">
+            <a:lumMod val="65000"/>
+            <a:lumOff val="35000"/>
+          </a:schemeClr>
+        </a:solidFill>
+        <a:round/>
+      </a:ln>
+    </cs:spPr>
+  </cs:upBar>
+  <cs:valueAxis>
+    <cs:lnRef idx="0"/>
+    <cs:fillRef idx="0"/>
+    <cs:effectRef idx="0"/>
+    <cs:fontRef idx="minor">
+      <a:schemeClr val="tx1">
+        <a:lumMod val="65000"/>
+        <a:lumOff val="35000"/>
+      </a:schemeClr>
+    </cs:fontRef>
+    <cs:spPr>
+      <a:ln w="9525" cap="flat" cmpd="sng" algn="ctr">
+        <a:solidFill>
+          <a:schemeClr val="tx1">
+            <a:lumMod val="25000"/>
+            <a:lumOff val="75000"/>
+          </a:schemeClr>
+        </a:solidFill>
+        <a:round/>
+      </a:ln>
+    </cs:spPr>
+    <cs:defRPr sz="1197" kern="1200"/>
+  </cs:valueAxis>
+  <cs:wall>
+    <cs:lnRef idx="0"/>
+    <cs:fillRef idx="0"/>
+    <cs:effectRef idx="0"/>
+    <cs:fontRef idx="minor">
+      <a:schemeClr val="tx1"/>
+    </cs:fontRef>
+    <cs:spPr>
+      <a:noFill/>
+      <a:ln>
+        <a:noFill/>
+      </a:ln>
+    </cs:spPr>
+  </cs:wall>
+</cs:chartStyle>
+</file>
+
 <file path=ppt/slideLayouts/slideLayout1.xml><?xml version="1.0" encoding="utf-8"?>
 <p:sldLayout xmlns:a="http://schemas.openxmlformats.org/drawingml/2006/main" xmlns:r="http://schemas.openxmlformats.org/officeDocument/2006/relationships" xmlns:p="http://schemas.openxmlformats.org/presentationml/2006/main" type="title" preserve="1">
   <p:cSld name="Title Slide">
@@ -255,7 +4220,7 @@
           <a:p>
             <a:fld id="{4767B314-B9F7-4C43-B86B-0CCAED4A0117}" type="datetimeFigureOut">
               <a:rPr lang="en-US" smtClean="0"/>
-              <a:t>9/5/2024</a:t>
+              <a:t>9/6/24</a:t>
             </a:fld>
             <a:endParaRPr lang="en-US"/>
           </a:p>
@@ -423,7 +4388,7 @@
           <a:p>
             <a:fld id="{4767B314-B9F7-4C43-B86B-0CCAED4A0117}" type="datetimeFigureOut">
               <a:rPr lang="en-US" smtClean="0"/>
-              <a:t>9/5/2024</a:t>
+              <a:t>9/6/24</a:t>
             </a:fld>
             <a:endParaRPr lang="en-US"/>
           </a:p>
@@ -601,7 +4566,7 @@
           <a:p>
             <a:fld id="{4767B314-B9F7-4C43-B86B-0CCAED4A0117}" type="datetimeFigureOut">
               <a:rPr lang="en-US" smtClean="0"/>
-              <a:t>9/5/2024</a:t>
+              <a:t>9/6/24</a:t>
             </a:fld>
             <a:endParaRPr lang="en-US"/>
           </a:p>
@@ -769,7 +4734,7 @@
           <a:p>
             <a:fld id="{4767B314-B9F7-4C43-B86B-0CCAED4A0117}" type="datetimeFigureOut">
               <a:rPr lang="en-US" smtClean="0"/>
-              <a:t>9/5/2024</a:t>
+              <a:t>9/6/24</a:t>
             </a:fld>
             <a:endParaRPr lang="en-US"/>
           </a:p>
@@ -1014,7 +4979,7 @@
           <a:p>
             <a:fld id="{4767B314-B9F7-4C43-B86B-0CCAED4A0117}" type="datetimeFigureOut">
               <a:rPr lang="en-US" smtClean="0"/>
-              <a:t>9/5/2024</a:t>
+              <a:t>9/6/24</a:t>
             </a:fld>
             <a:endParaRPr lang="en-US"/>
           </a:p>
@@ -1243,7 +5208,7 @@
           <a:p>
             <a:fld id="{4767B314-B9F7-4C43-B86B-0CCAED4A0117}" type="datetimeFigureOut">
               <a:rPr lang="en-US" smtClean="0"/>
-              <a:t>9/5/2024</a:t>
+              <a:t>9/6/24</a:t>
             </a:fld>
             <a:endParaRPr lang="en-US"/>
           </a:p>
@@ -1607,7 +5572,7 @@
           <a:p>
             <a:fld id="{4767B314-B9F7-4C43-B86B-0CCAED4A0117}" type="datetimeFigureOut">
               <a:rPr lang="en-US" smtClean="0"/>
-              <a:t>9/5/2024</a:t>
+              <a:t>9/6/24</a:t>
             </a:fld>
             <a:endParaRPr lang="en-US"/>
           </a:p>
@@ -1724,7 +5689,7 @@
           <a:p>
             <a:fld id="{4767B314-B9F7-4C43-B86B-0CCAED4A0117}" type="datetimeFigureOut">
               <a:rPr lang="en-US" smtClean="0"/>
-              <a:t>9/5/2024</a:t>
+              <a:t>9/6/24</a:t>
             </a:fld>
             <a:endParaRPr lang="en-US"/>
           </a:p>
@@ -1819,7 +5784,7 @@
           <a:p>
             <a:fld id="{4767B314-B9F7-4C43-B86B-0CCAED4A0117}" type="datetimeFigureOut">
               <a:rPr lang="en-US" smtClean="0"/>
-              <a:t>9/5/2024</a:t>
+              <a:t>9/6/24</a:t>
             </a:fld>
             <a:endParaRPr lang="en-US"/>
           </a:p>
@@ -2094,7 +6059,7 @@
           <a:p>
             <a:fld id="{4767B314-B9F7-4C43-B86B-0CCAED4A0117}" type="datetimeFigureOut">
               <a:rPr lang="en-US" smtClean="0"/>
-              <a:t>9/5/2024</a:t>
+              <a:t>9/6/24</a:t>
             </a:fld>
             <a:endParaRPr lang="en-US"/>
           </a:p>
@@ -2346,7 +6311,7 @@
           <a:p>
             <a:fld id="{4767B314-B9F7-4C43-B86B-0CCAED4A0117}" type="datetimeFigureOut">
               <a:rPr lang="en-US" smtClean="0"/>
-              <a:t>9/5/2024</a:t>
+              <a:t>9/6/24</a:t>
             </a:fld>
             <a:endParaRPr lang="en-US"/>
           </a:p>
@@ -2557,7 +6522,7 @@
           <a:p>
             <a:fld id="{4767B314-B9F7-4C43-B86B-0CCAED4A0117}" type="datetimeFigureOut">
               <a:rPr lang="en-US" smtClean="0"/>
-              <a:t>9/5/2024</a:t>
+              <a:t>9/6/24</a:t>
             </a:fld>
             <a:endParaRPr lang="en-US"/>
           </a:p>
@@ -3293,6 +7258,369 @@
 <file path=ppt/slides/slide2.xml><?xml version="1.0" encoding="utf-8"?>
 <p:sld xmlns:a="http://schemas.openxmlformats.org/drawingml/2006/main" xmlns:r="http://schemas.openxmlformats.org/officeDocument/2006/relationships" xmlns:p="http://schemas.openxmlformats.org/presentationml/2006/main">
   <p:cSld>
+    <p:spTree>
+      <p:nvGrpSpPr>
+        <p:cNvPr id="1" name=""/>
+        <p:cNvGrpSpPr/>
+        <p:nvPr/>
+      </p:nvGrpSpPr>
+      <p:grpSpPr>
+        <a:xfrm>
+          <a:off x="0" y="0"/>
+          <a:ext cx="0" cy="0"/>
+          <a:chOff x="0" y="0"/>
+          <a:chExt cx="0" cy="0"/>
+        </a:xfrm>
+      </p:grpSpPr>
+      <p:sp>
+        <p:nvSpPr>
+          <p:cNvPr id="2" name="Title 1">
+            <a:extLst>
+              <a:ext uri="{FF2B5EF4-FFF2-40B4-BE49-F238E27FC236}">
+                <a16:creationId xmlns:a16="http://schemas.microsoft.com/office/drawing/2014/main" id="{B2100E75-73D2-FB09-00FC-4D7E137028BA}"/>
+              </a:ext>
+            </a:extLst>
+          </p:cNvPr>
+          <p:cNvSpPr>
+            <a:spLocks noGrp="1"/>
+          </p:cNvSpPr>
+          <p:nvPr>
+            <p:ph type="title"/>
+          </p:nvPr>
+        </p:nvSpPr>
+        <p:spPr>
+          <a:xfrm>
+            <a:off x="272143" y="190954"/>
+            <a:ext cx="10657114" cy="1213303"/>
+          </a:xfrm>
+        </p:spPr>
+        <p:txBody>
+          <a:bodyPr>
+            <a:normAutofit/>
+          </a:bodyPr>
+          <a:lstStyle/>
+          <a:p>
+            <a:r>
+              <a:rPr lang="en-GB" sz="2800" b="1" dirty="0">
+                <a:latin typeface="Century Gothic" panose="020B0502020202020204" pitchFamily="34" charset="0"/>
+              </a:rPr>
+              <a:t>Between 2013 and 2017, the average number of orders per month quadrupled, growing from 90 to 360. </a:t>
+            </a:r>
+            <a:endParaRPr lang="en-NG" sz="2800" b="1" dirty="0">
+              <a:latin typeface="Century Gothic" panose="020B0502020202020204" pitchFamily="34" charset="0"/>
+            </a:endParaRPr>
+          </a:p>
+        </p:txBody>
+      </p:sp>
+      <p:cxnSp>
+        <p:nvCxnSpPr>
+          <p:cNvPr id="5" name="Straight Connector 4">
+            <a:extLst>
+              <a:ext uri="{FF2B5EF4-FFF2-40B4-BE49-F238E27FC236}">
+                <a16:creationId xmlns:a16="http://schemas.microsoft.com/office/drawing/2014/main" id="{DE812377-65EE-1BDA-BD4C-6BB5EEBE0F97}"/>
+              </a:ext>
+            </a:extLst>
+          </p:cNvPr>
+          <p:cNvCxnSpPr/>
+          <p:nvPr/>
+        </p:nvCxnSpPr>
+        <p:spPr>
+          <a:xfrm>
+            <a:off x="272143" y="1404257"/>
+            <a:ext cx="10472057" cy="0"/>
+          </a:xfrm>
+          <a:prstGeom prst="line">
+            <a:avLst/>
+          </a:prstGeom>
+        </p:spPr>
+        <p:style>
+          <a:lnRef idx="2">
+            <a:schemeClr val="dk1"/>
+          </a:lnRef>
+          <a:fillRef idx="0">
+            <a:schemeClr val="dk1"/>
+          </a:fillRef>
+          <a:effectRef idx="1">
+            <a:schemeClr val="dk1"/>
+          </a:effectRef>
+          <a:fontRef idx="minor">
+            <a:schemeClr val="tx1"/>
+          </a:fontRef>
+        </p:style>
+      </p:cxnSp>
+      <p:graphicFrame>
+        <p:nvGraphicFramePr>
+          <p:cNvPr id="6" name="Chart 5">
+            <a:extLst>
+              <a:ext uri="{FF2B5EF4-FFF2-40B4-BE49-F238E27FC236}">
+                <a16:creationId xmlns:a16="http://schemas.microsoft.com/office/drawing/2014/main" id="{70EC8FD6-0072-E335-CB8B-3C2E02531EAF}"/>
+              </a:ext>
+            </a:extLst>
+          </p:cNvPr>
+          <p:cNvGraphicFramePr>
+            <a:graphicFrameLocks/>
+          </p:cNvGraphicFramePr>
+          <p:nvPr>
+            <p:extLst>
+              <p:ext uri="{D42A27DB-BD31-4B8C-83A1-F6EECF244321}">
+                <p14:modId xmlns:p14="http://schemas.microsoft.com/office/powerpoint/2010/main" val="502005455"/>
+              </p:ext>
+            </p:extLst>
+          </p:nvPr>
+        </p:nvGraphicFramePr>
+        <p:xfrm>
+          <a:off x="272143" y="1937204"/>
+          <a:ext cx="7282089" cy="3886653"/>
+        </p:xfrm>
+        <a:graphic>
+          <a:graphicData uri="http://schemas.openxmlformats.org/drawingml/2006/chart">
+            <c:chart xmlns:c="http://schemas.openxmlformats.org/drawingml/2006/chart" xmlns:r="http://schemas.openxmlformats.org/officeDocument/2006/relationships" r:id="rId2"/>
+          </a:graphicData>
+        </a:graphic>
+      </p:graphicFrame>
+      <p:sp>
+        <p:nvSpPr>
+          <p:cNvPr id="7" name="TextBox 6">
+            <a:extLst>
+              <a:ext uri="{FF2B5EF4-FFF2-40B4-BE49-F238E27FC236}">
+                <a16:creationId xmlns:a16="http://schemas.microsoft.com/office/drawing/2014/main" id="{1A4B530D-8FD8-FED8-5ECF-A7201314B485}"/>
+              </a:ext>
+            </a:extLst>
+          </p:cNvPr>
+          <p:cNvSpPr txBox="1"/>
+          <p:nvPr/>
+        </p:nvSpPr>
+        <p:spPr>
+          <a:xfrm>
+            <a:off x="8360229" y="1937203"/>
+            <a:ext cx="3408984" cy="2339102"/>
+          </a:xfrm>
+          <a:prstGeom prst="rect">
+            <a:avLst/>
+          </a:prstGeom>
+          <a:noFill/>
+        </p:spPr>
+        <p:txBody>
+          <a:bodyPr wrap="square" rtlCol="0">
+            <a:spAutoFit/>
+          </a:bodyPr>
+          <a:lstStyle/>
+          <a:p>
+            <a:r>
+              <a:rPr lang="en-NG" b="1" i="1" dirty="0"/>
+              <a:t>Additional context</a:t>
+            </a:r>
+          </a:p>
+          <a:p>
+            <a:pPr marL="285750" indent="-285750" algn="just">
+              <a:buFont typeface="Arial" panose="020B0604020202020204" pitchFamily="34" charset="0"/>
+              <a:buChar char="•"/>
+            </a:pPr>
+            <a:r>
+              <a:rPr lang="en-GB" sz="1600" i="1" dirty="0"/>
+              <a:t>Although 2017 records only cover two days, 25 orders were made during that period. In contrast, 2013 saw 90 orders completed over 26 days. This reflects a significant increase in order activity, showing much higher demand in a shorter time frame by 2017.</a:t>
+            </a:r>
+            <a:endParaRPr lang="en-NG" sz="1600" i="1" dirty="0"/>
+          </a:p>
+        </p:txBody>
+      </p:sp>
+    </p:spTree>
+    <p:extLst>
+      <p:ext uri="{BB962C8B-B14F-4D97-AF65-F5344CB8AC3E}">
+        <p14:creationId xmlns:p14="http://schemas.microsoft.com/office/powerpoint/2010/main" val="3801076910"/>
+      </p:ext>
+    </p:extLst>
+  </p:cSld>
+  <p:clrMapOvr>
+    <a:masterClrMapping/>
+  </p:clrMapOvr>
+</p:sld>
+</file>
+
+<file path=ppt/slides/slide3.xml><?xml version="1.0" encoding="utf-8"?>
+<p:sld xmlns:a="http://schemas.openxmlformats.org/drawingml/2006/main" xmlns:r="http://schemas.openxmlformats.org/officeDocument/2006/relationships" xmlns:p="http://schemas.openxmlformats.org/presentationml/2006/main">
+  <p:cSld>
+    <p:spTree>
+      <p:nvGrpSpPr>
+        <p:cNvPr id="1" name=""/>
+        <p:cNvGrpSpPr/>
+        <p:nvPr/>
+      </p:nvGrpSpPr>
+      <p:grpSpPr>
+        <a:xfrm>
+          <a:off x="0" y="0"/>
+          <a:ext cx="0" cy="0"/>
+          <a:chOff x="0" y="0"/>
+          <a:chExt cx="0" cy="0"/>
+        </a:xfrm>
+      </p:grpSpPr>
+      <p:sp>
+        <p:nvSpPr>
+          <p:cNvPr id="2" name="Title 1">
+            <a:extLst>
+              <a:ext uri="{FF2B5EF4-FFF2-40B4-BE49-F238E27FC236}">
+                <a16:creationId xmlns:a16="http://schemas.microsoft.com/office/drawing/2014/main" id="{B2100E75-73D2-FB09-00FC-4D7E137028BA}"/>
+              </a:ext>
+            </a:extLst>
+          </p:cNvPr>
+          <p:cNvSpPr>
+            <a:spLocks noGrp="1"/>
+          </p:cNvSpPr>
+          <p:nvPr>
+            <p:ph type="title"/>
+          </p:nvPr>
+        </p:nvSpPr>
+        <p:spPr>
+          <a:xfrm>
+            <a:off x="272143" y="190954"/>
+            <a:ext cx="10657114" cy="1213303"/>
+          </a:xfrm>
+        </p:spPr>
+        <p:txBody>
+          <a:bodyPr>
+            <a:normAutofit/>
+          </a:bodyPr>
+          <a:lstStyle/>
+          <a:p>
+            <a:r>
+              <a:rPr lang="en-GB" sz="2800" b="1" dirty="0">
+                <a:latin typeface="Century Gothic" panose="020B0502020202020204" pitchFamily="34" charset="0"/>
+              </a:rPr>
+              <a:t>As web engagement increases, the number of orders placed rises in a closely related pattern</a:t>
+            </a:r>
+            <a:endParaRPr lang="en-NG" sz="2800" b="1" dirty="0">
+              <a:latin typeface="Century Gothic" panose="020B0502020202020204" pitchFamily="34" charset="0"/>
+            </a:endParaRPr>
+          </a:p>
+        </p:txBody>
+      </p:sp>
+      <p:cxnSp>
+        <p:nvCxnSpPr>
+          <p:cNvPr id="5" name="Straight Connector 4">
+            <a:extLst>
+              <a:ext uri="{FF2B5EF4-FFF2-40B4-BE49-F238E27FC236}">
+                <a16:creationId xmlns:a16="http://schemas.microsoft.com/office/drawing/2014/main" id="{DE812377-65EE-1BDA-BD4C-6BB5EEBE0F97}"/>
+              </a:ext>
+            </a:extLst>
+          </p:cNvPr>
+          <p:cNvCxnSpPr/>
+          <p:nvPr/>
+        </p:nvCxnSpPr>
+        <p:spPr>
+          <a:xfrm>
+            <a:off x="272143" y="1404257"/>
+            <a:ext cx="10472057" cy="0"/>
+          </a:xfrm>
+          <a:prstGeom prst="line">
+            <a:avLst/>
+          </a:prstGeom>
+        </p:spPr>
+        <p:style>
+          <a:lnRef idx="2">
+            <a:schemeClr val="dk1"/>
+          </a:lnRef>
+          <a:fillRef idx="0">
+            <a:schemeClr val="dk1"/>
+          </a:fillRef>
+          <a:effectRef idx="1">
+            <a:schemeClr val="dk1"/>
+          </a:effectRef>
+          <a:fontRef idx="minor">
+            <a:schemeClr val="tx1"/>
+          </a:fontRef>
+        </p:style>
+      </p:cxnSp>
+      <p:sp>
+        <p:nvSpPr>
+          <p:cNvPr id="7" name="TextBox 6">
+            <a:extLst>
+              <a:ext uri="{FF2B5EF4-FFF2-40B4-BE49-F238E27FC236}">
+                <a16:creationId xmlns:a16="http://schemas.microsoft.com/office/drawing/2014/main" id="{1A4B530D-8FD8-FED8-5ECF-A7201314B485}"/>
+              </a:ext>
+            </a:extLst>
+          </p:cNvPr>
+          <p:cNvSpPr txBox="1"/>
+          <p:nvPr/>
+        </p:nvSpPr>
+        <p:spPr>
+          <a:xfrm>
+            <a:off x="8360229" y="1937203"/>
+            <a:ext cx="3408984" cy="2339102"/>
+          </a:xfrm>
+          <a:prstGeom prst="rect">
+            <a:avLst/>
+          </a:prstGeom>
+          <a:noFill/>
+        </p:spPr>
+        <p:txBody>
+          <a:bodyPr wrap="square" rtlCol="0">
+            <a:spAutoFit/>
+          </a:bodyPr>
+          <a:lstStyle/>
+          <a:p>
+            <a:r>
+              <a:rPr lang="en-NG" b="1" i="1" dirty="0">
+                <a:latin typeface="Century Gothic" panose="020B0502020202020204" pitchFamily="34" charset="0"/>
+              </a:rPr>
+              <a:t>Additional context</a:t>
+            </a:r>
+          </a:p>
+          <a:p>
+            <a:pPr algn="just"/>
+            <a:r>
+              <a:rPr lang="en-GB" sz="1600" i="1" dirty="0"/>
+              <a:t>This indicates that higher activity on the website—such as browsing or adding items to a cart—directly influences the number of purchases made. Improving web user experience or increasing traffic could, therefore, have a significant impact on boosting sales.</a:t>
+            </a:r>
+            <a:endParaRPr lang="en-NG" sz="1600" i="1" dirty="0"/>
+          </a:p>
+        </p:txBody>
+      </p:sp>
+      <p:graphicFrame>
+        <p:nvGraphicFramePr>
+          <p:cNvPr id="3" name="Chart 2">
+            <a:extLst>
+              <a:ext uri="{FF2B5EF4-FFF2-40B4-BE49-F238E27FC236}">
+                <a16:creationId xmlns:a16="http://schemas.microsoft.com/office/drawing/2014/main" id="{55213A78-303E-7636-D281-79F314794A7A}"/>
+              </a:ext>
+            </a:extLst>
+          </p:cNvPr>
+          <p:cNvGraphicFramePr>
+            <a:graphicFrameLocks/>
+          </p:cNvGraphicFramePr>
+          <p:nvPr>
+            <p:extLst>
+              <p:ext uri="{D42A27DB-BD31-4B8C-83A1-F6EECF244321}">
+                <p14:modId xmlns:p14="http://schemas.microsoft.com/office/powerpoint/2010/main" val="2727773125"/>
+              </p:ext>
+            </p:extLst>
+          </p:nvPr>
+        </p:nvGraphicFramePr>
+        <p:xfrm>
+          <a:off x="457201" y="1817919"/>
+          <a:ext cx="7783286" cy="4411429"/>
+        </p:xfrm>
+        <a:graphic>
+          <a:graphicData uri="http://schemas.openxmlformats.org/drawingml/2006/chart">
+            <c:chart xmlns:c="http://schemas.openxmlformats.org/drawingml/2006/chart" xmlns:r="http://schemas.openxmlformats.org/officeDocument/2006/relationships" r:id="rId2"/>
+          </a:graphicData>
+        </a:graphic>
+      </p:graphicFrame>
+    </p:spTree>
+    <p:extLst>
+      <p:ext uri="{BB962C8B-B14F-4D97-AF65-F5344CB8AC3E}">
+        <p14:creationId xmlns:p14="http://schemas.microsoft.com/office/powerpoint/2010/main" val="2688743844"/>
+      </p:ext>
+    </p:extLst>
+  </p:cSld>
+  <p:clrMapOvr>
+    <a:masterClrMapping/>
+  </p:clrMapOvr>
+</p:sld>
+</file>
+
+<file path=ppt/slides/slide4.xml><?xml version="1.0" encoding="utf-8"?>
+<p:sld xmlns:a="http://schemas.openxmlformats.org/drawingml/2006/main" xmlns:r="http://schemas.openxmlformats.org/officeDocument/2006/relationships" xmlns:p="http://schemas.openxmlformats.org/presentationml/2006/main">
+  <p:cSld>
     <p:bg>
       <p:bgPr>
         <a:solidFill>
@@ -3789,7 +8117,7 @@
 </p:sld>
 </file>
 
-<file path=ppt/slides/slide3.xml><?xml version="1.0" encoding="utf-8"?>
+<file path=ppt/slides/slide5.xml><?xml version="1.0" encoding="utf-8"?>
 <p:sld xmlns:a="http://schemas.openxmlformats.org/drawingml/2006/main" xmlns:r="http://schemas.openxmlformats.org/officeDocument/2006/relationships" xmlns:p="http://schemas.openxmlformats.org/presentationml/2006/main">
   <p:cSld>
     <p:bg>
@@ -4990,7 +9318,7 @@
 </p:sld>
 </file>
 
-<file path=ppt/slides/slide4.xml><?xml version="1.0" encoding="utf-8"?>
+<file path=ppt/slides/slide6.xml><?xml version="1.0" encoding="utf-8"?>
 <p:sld xmlns:a="http://schemas.openxmlformats.org/drawingml/2006/main" xmlns:r="http://schemas.openxmlformats.org/officeDocument/2006/relationships" xmlns:p="http://schemas.openxmlformats.org/presentationml/2006/main">
   <p:cSld>
     <p:bg>
@@ -5546,7 +9874,7 @@
 </p:sld>
 </file>
 
-<file path=ppt/slides/slide5.xml><?xml version="1.0" encoding="utf-8"?>
+<file path=ppt/slides/slide7.xml><?xml version="1.0" encoding="utf-8"?>
 <p:sld xmlns:a="http://schemas.openxmlformats.org/drawingml/2006/main" xmlns:r="http://schemas.openxmlformats.org/officeDocument/2006/relationships" xmlns:p="http://schemas.openxmlformats.org/presentationml/2006/main">
   <p:cSld>
     <p:bg>
@@ -6359,7 +10687,7 @@
 </p:sld>
 </file>
 
-<file path=ppt/slides/slide6.xml><?xml version="1.0" encoding="utf-8"?>
+<file path=ppt/slides/slide8.xml><?xml version="1.0" encoding="utf-8"?>
 <p:sld xmlns:a="http://schemas.openxmlformats.org/drawingml/2006/main" xmlns:r="http://schemas.openxmlformats.org/officeDocument/2006/relationships" xmlns:p="http://schemas.openxmlformats.org/presentationml/2006/main">
   <p:cSld>
     <p:bg>

</xml_diff>